<commit_message>
Updated the presentation again.
</commit_message>
<xml_diff>
--- a/PSCONFEU23_payette_tiny.pptx
+++ b/PSCONFEU23_payette_tiny.pptx
@@ -7,10 +7,10 @@
     <p:sldMasterId id="2147483684" r:id="rId6"/>
   </p:sldMasterIdLst>
   <p:notesMasterIdLst>
-    <p:notesMasterId r:id="rId25"/>
+    <p:notesMasterId r:id="rId26"/>
   </p:notesMasterIdLst>
   <p:handoutMasterIdLst>
-    <p:handoutMasterId r:id="rId26"/>
+    <p:handoutMasterId r:id="rId27"/>
   </p:handoutMasterIdLst>
   <p:sldIdLst>
     <p:sldId id="259" r:id="rId7"/>
@@ -19,18 +19,19 @@
     <p:sldId id="260" r:id="rId10"/>
     <p:sldId id="268" r:id="rId11"/>
     <p:sldId id="280" r:id="rId12"/>
-    <p:sldId id="264" r:id="rId13"/>
-    <p:sldId id="275" r:id="rId14"/>
-    <p:sldId id="269" r:id="rId15"/>
-    <p:sldId id="270" r:id="rId16"/>
-    <p:sldId id="271" r:id="rId17"/>
-    <p:sldId id="273" r:id="rId18"/>
-    <p:sldId id="272" r:id="rId19"/>
-    <p:sldId id="274" r:id="rId20"/>
-    <p:sldId id="277" r:id="rId21"/>
-    <p:sldId id="278" r:id="rId22"/>
-    <p:sldId id="279" r:id="rId23"/>
-    <p:sldId id="265" r:id="rId24"/>
+    <p:sldId id="281" r:id="rId13"/>
+    <p:sldId id="264" r:id="rId14"/>
+    <p:sldId id="275" r:id="rId15"/>
+    <p:sldId id="269" r:id="rId16"/>
+    <p:sldId id="270" r:id="rId17"/>
+    <p:sldId id="271" r:id="rId18"/>
+    <p:sldId id="273" r:id="rId19"/>
+    <p:sldId id="272" r:id="rId20"/>
+    <p:sldId id="274" r:id="rId21"/>
+    <p:sldId id="277" r:id="rId22"/>
+    <p:sldId id="278" r:id="rId23"/>
+    <p:sldId id="279" r:id="rId24"/>
+    <p:sldId id="265" r:id="rId25"/>
   </p:sldIdLst>
   <p:sldSz cx="12192000" cy="6858000"/>
   <p:notesSz cx="6858000" cy="9144000"/>
@@ -5247,7 +5248,7 @@
           <a:p>
             <a:fld id="{69440670-43D7-400A-ABC5-B69E064DBB37}" type="datetimeFigureOut">
               <a:rPr lang="en-GB" smtClean="0"/>
-              <a:t>13/06/2023</a:t>
+              <a:t>14/06/2023</a:t>
             </a:fld>
             <a:endParaRPr lang="en-GB"/>
           </a:p>
@@ -5424,7 +5425,7 @@
           <a:p>
             <a:fld id="{611B03A4-75C9-4E3D-9183-2102CA9AEC33}" type="datetimeFigureOut">
               <a:rPr lang="en-GB" smtClean="0"/>
-              <a:t>13/06/2023</a:t>
+              <a:t>14/06/2023</a:t>
             </a:fld>
             <a:endParaRPr lang="en-GB"/>
           </a:p>
@@ -9461,7 +9462,7 @@
             </a:r>
             <a:r>
               <a:rPr lang="fr-FR" dirty="0"/>
-              <a:t> 3</a:t>
+              <a:t> 2</a:t>
             </a:r>
             <a:endParaRPr lang="en-GB" dirty="0"/>
           </a:p>
@@ -9486,7 +9487,7 @@
         <p:spPr/>
         <p:txBody>
           <a:bodyPr>
-            <a:normAutofit/>
+            <a:normAutofit lnSpcReduction="10000"/>
           </a:bodyPr>
           <a:lstStyle/>
           <a:p>
@@ -9496,49 +9497,42 @@
             </a:pPr>
             <a:r>
               <a:rPr lang="fr-FR" dirty="0" err="1"/>
-              <a:t>Cardinality</a:t>
-            </a:r>
-            <a:r>
-              <a:rPr lang="fr-FR" dirty="0"/>
-              <a:t> and Type Conversions</a:t>
+              <a:t>Namespace</a:t>
+            </a:r>
+            <a:r>
+              <a:rPr lang="fr-FR" dirty="0"/>
+              <a:t> management</a:t>
             </a:r>
           </a:p>
           <a:p>
             <a:pPr lvl="1"/>
             <a:r>
               <a:rPr lang="fr-FR" dirty="0"/>
-              <a:t>You </a:t>
+              <a:t>An application </a:t>
             </a:r>
             <a:r>
               <a:rPr lang="fr-FR" dirty="0" err="1"/>
-              <a:t>can’t</a:t>
-            </a:r>
-            <a:r>
-              <a:rPr lang="fr-FR" dirty="0"/>
-              <a:t> tell if </a:t>
+              <a:t>contains</a:t>
+            </a:r>
+            <a:r>
+              <a:rPr lang="fr-FR" dirty="0"/>
+              <a:t> a lot of  </a:t>
             </a:r>
             <a:r>
               <a:rPr lang="fr-FR" dirty="0" err="1"/>
-              <a:t>you’ve</a:t>
-            </a:r>
-            <a:r>
-              <a:rPr lang="fr-FR" dirty="0"/>
-              <a:t> passing a singleton or a collection </a:t>
+              <a:t>named</a:t>
+            </a:r>
+            <a:r>
+              <a:rPr lang="fr-FR" dirty="0"/>
+              <a:t> </a:t>
             </a:r>
             <a:r>
               <a:rPr lang="fr-FR" dirty="0" err="1"/>
-              <a:t>into</a:t>
-            </a:r>
-            <a:r>
-              <a:rPr lang="fr-FR" dirty="0"/>
-              <a:t> a pipeline</a:t>
-            </a:r>
-          </a:p>
-          <a:p>
-            <a:pPr lvl="1"/>
-            <a:r>
-              <a:rPr lang="fr-FR" dirty="0"/>
-              <a:t>Output types of </a:t>
+              <a:t>entities</a:t>
+            </a:r>
+            <a:r>
+              <a:rPr lang="fr-FR" dirty="0"/>
+              <a:t> (</a:t>
             </a:r>
             <a:r>
               <a:rPr lang="fr-FR" dirty="0" err="1"/>
@@ -9546,16 +9540,83 @@
             </a:r>
             <a:r>
               <a:rPr lang="fr-FR" dirty="0"/>
+              <a:t>, data structures)</a:t>
+            </a:r>
+          </a:p>
+          <a:p>
+            <a:pPr lvl="1"/>
+            <a:r>
+              <a:rPr lang="fr-FR" dirty="0"/>
+              <a:t>The module </a:t>
+            </a:r>
+            <a:r>
+              <a:rPr lang="fr-FR" dirty="0" err="1"/>
+              <a:t>mechanism</a:t>
+            </a:r>
+            <a:r>
+              <a:rPr lang="fr-FR" dirty="0"/>
+              <a:t> </a:t>
+            </a:r>
+            <a:r>
+              <a:rPr lang="fr-FR" dirty="0" err="1"/>
+              <a:t>is</a:t>
+            </a:r>
+            <a:r>
+              <a:rPr lang="fr-FR" dirty="0"/>
+              <a:t> </a:t>
+            </a:r>
+            <a:r>
+              <a:rPr lang="fr-FR" dirty="0" err="1"/>
+              <a:t>designed</a:t>
+            </a:r>
+            <a:r>
+              <a:rPr lang="fr-FR" dirty="0"/>
+              <a:t> for sharing code; not </a:t>
+            </a:r>
+            <a:r>
+              <a:rPr lang="fr-FR" dirty="0" err="1"/>
+              <a:t>really</a:t>
+            </a:r>
+            <a:r>
+              <a:rPr lang="fr-FR" dirty="0"/>
+              <a:t> </a:t>
+            </a:r>
+            <a:r>
+              <a:rPr lang="fr-FR" dirty="0" err="1"/>
+              <a:t>appropriate</a:t>
+            </a:r>
+            <a:r>
+              <a:rPr lang="fr-FR" dirty="0"/>
+              <a:t> for program-</a:t>
+            </a:r>
+            <a:r>
+              <a:rPr lang="fr-FR" dirty="0" err="1"/>
+              <a:t>level</a:t>
+            </a:r>
+            <a:r>
+              <a:rPr lang="fr-FR" dirty="0"/>
+              <a:t> abstractions</a:t>
+            </a:r>
+          </a:p>
+          <a:p>
+            <a:pPr lvl="1"/>
+            <a:r>
+              <a:rPr lang="fr-FR" dirty="0"/>
+              <a:t>Dynamic modules and </a:t>
+            </a:r>
+            <a:r>
+              <a:rPr lang="fr-FR" dirty="0" err="1"/>
+              <a:t>closures</a:t>
+            </a:r>
+            <a:r>
+              <a:rPr lang="fr-FR" dirty="0"/>
               <a:t> are </a:t>
             </a:r>
             <a:r>
               <a:rPr lang="fr-FR" dirty="0" err="1"/>
-              <a:t>just</a:t>
-            </a:r>
-            <a:r>
-              <a:rPr lang="fr-FR" dirty="0"/>
-              <a:t> documentation</a:t>
-            </a:r>
+              <a:t>sufficient</a:t>
+            </a:r>
+            <a:endParaRPr lang="fr-FR" dirty="0"/>
           </a:p>
           <a:p>
             <a:r>
@@ -9567,60 +9628,47 @@
             <a:pPr lvl="1"/>
             <a:r>
               <a:rPr lang="fr-FR" dirty="0"/>
-              <a:t>Use </a:t>
-            </a:r>
-            <a:r>
-              <a:rPr lang="fr-FR" i="1" dirty="0"/>
-              <a:t>set-</a:t>
-            </a:r>
-            <a:r>
-              <a:rPr lang="fr-FR" i="1" dirty="0" err="1"/>
-              <a:t>strictmode</a:t>
-            </a:r>
-            <a:r>
-              <a:rPr lang="fr-FR" i="1" dirty="0"/>
-              <a:t> –</a:t>
-            </a:r>
-            <a:r>
-              <a:rPr lang="fr-FR" i="1" dirty="0" err="1"/>
-              <a:t>latest</a:t>
-            </a:r>
-            <a:endParaRPr lang="fr-FR" i="1" dirty="0"/>
-          </a:p>
-          <a:p>
-            <a:pPr lvl="1"/>
-            <a:r>
-              <a:rPr lang="fr-FR" dirty="0"/>
-              <a:t>Methods in classes are </a:t>
+              <a:t>PowerShell </a:t>
             </a:r>
             <a:r>
               <a:rPr lang="fr-FR" dirty="0" err="1"/>
-              <a:t>strongly</a:t>
-            </a:r>
-            <a:r>
-              <a:rPr lang="fr-FR" dirty="0"/>
-              <a:t> </a:t>
+              <a:t>introduce</a:t>
+            </a:r>
+            <a:r>
+              <a:rPr lang="fr-FR" dirty="0"/>
+              <a:t> user-</a:t>
             </a:r>
             <a:r>
               <a:rPr lang="fr-FR" dirty="0" err="1"/>
-              <a:t>typed</a:t>
-            </a:r>
-            <a:r>
-              <a:rPr lang="fr-FR" dirty="0"/>
-              <a:t> and return types are </a:t>
+              <a:t>defined</a:t>
+            </a:r>
+            <a:r>
+              <a:rPr lang="fr-FR" dirty="0"/>
+              <a:t> classes in V5.0. Classes are </a:t>
             </a:r>
             <a:r>
               <a:rPr lang="fr-FR" dirty="0" err="1"/>
-              <a:t>enforced</a:t>
-            </a:r>
-            <a:endParaRPr lang="fr-FR" dirty="0"/>
+              <a:t>well-suited</a:t>
+            </a:r>
+            <a:r>
+              <a:rPr lang="fr-FR" dirty="0"/>
+              <a:t> for </a:t>
+            </a:r>
+            <a:r>
+              <a:rPr lang="fr-FR" dirty="0" err="1"/>
+              <a:t>namespace</a:t>
+            </a:r>
+            <a:r>
+              <a:rPr lang="fr-FR" dirty="0"/>
+              <a:t> management</a:t>
+            </a:r>
           </a:p>
         </p:txBody>
       </p:sp>
     </p:spTree>
     <p:extLst>
       <p:ext uri="{BB962C8B-B14F-4D97-AF65-F5344CB8AC3E}">
-        <p14:creationId xmlns:p14="http://schemas.microsoft.com/office/powerpoint/2010/main" val="676311950"/>
+        <p14:creationId xmlns:p14="http://schemas.microsoft.com/office/powerpoint/2010/main" val="1971721765"/>
       </p:ext>
     </p:extLst>
   </p:cSld>
@@ -9649,10 +9697,10 @@
       </p:grpSpPr>
       <p:sp>
         <p:nvSpPr>
-          <p:cNvPr id="2" name="Title 1">
+          <p:cNvPr id="2" name="Titre 1">
             <a:extLst>
               <a:ext uri="{FF2B5EF4-FFF2-40B4-BE49-F238E27FC236}">
-                <a16:creationId xmlns:a16="http://schemas.microsoft.com/office/drawing/2014/main" id="{3082E341-7F6E-945D-664B-0026BF1C1366}"/>
+                <a16:creationId xmlns:a16="http://schemas.microsoft.com/office/drawing/2014/main" id="{5191E0F2-FE77-51ED-3F72-223B58926E74}"/>
               </a:ext>
             </a:extLst>
           </p:cNvPr>
@@ -9669,22 +9717,23 @@
           <a:lstStyle/>
           <a:p>
             <a:r>
-              <a:rPr lang="en-US" dirty="0" err="1"/>
+              <a:rPr lang="fr-FR" dirty="0" err="1"/>
               <a:t>Challange</a:t>
             </a:r>
             <a:r>
-              <a:rPr lang="en-US" dirty="0"/>
-              <a:t> 4</a:t>
-            </a:r>
+              <a:rPr lang="fr-FR" dirty="0"/>
+              <a:t> 3</a:t>
+            </a:r>
+            <a:endParaRPr lang="en-GB" dirty="0"/>
           </a:p>
         </p:txBody>
       </p:sp>
       <p:sp>
         <p:nvSpPr>
-          <p:cNvPr id="3" name="Content Placeholder 2">
+          <p:cNvPr id="3" name="Espace réservé du contenu 2">
             <a:extLst>
               <a:ext uri="{FF2B5EF4-FFF2-40B4-BE49-F238E27FC236}">
-                <a16:creationId xmlns:a16="http://schemas.microsoft.com/office/drawing/2014/main" id="{8B103F6A-923C-4BF7-ABF2-0B0896986988}"/>
+                <a16:creationId xmlns:a16="http://schemas.microsoft.com/office/drawing/2014/main" id="{07D5023A-BA6F-B725-CF78-FD889E577EA6}"/>
               </a:ext>
             </a:extLst>
           </p:cNvPr>
@@ -9697,47 +9746,142 @@
         </p:nvSpPr>
         <p:spPr/>
         <p:txBody>
-          <a:bodyPr/>
+          <a:bodyPr>
+            <a:normAutofit/>
+          </a:bodyPr>
           <a:lstStyle/>
           <a:p>
-            <a:r>
-              <a:rPr lang="en-US" dirty="0"/>
-              <a:t>Performance</a:t>
+            <a:pPr>
+              <a:buFont typeface="Wingdings" panose="05000000000000000000" pitchFamily="2" charset="2"/>
+              <a:buChar char="§"/>
+            </a:pPr>
+            <a:r>
+              <a:rPr lang="fr-FR" dirty="0" err="1"/>
+              <a:t>Cardinality</a:t>
+            </a:r>
+            <a:r>
+              <a:rPr lang="fr-FR" dirty="0"/>
+              <a:t> and Type Conversions</a:t>
             </a:r>
           </a:p>
           <a:p>
             <a:pPr lvl="1"/>
             <a:r>
-              <a:rPr lang="en-US" dirty="0"/>
-              <a:t>PowerShell function invocation is *slow*</a:t>
+              <a:rPr lang="fr-FR" dirty="0"/>
+              <a:t>You </a:t>
+            </a:r>
+            <a:r>
+              <a:rPr lang="fr-FR" dirty="0" err="1"/>
+              <a:t>can’t</a:t>
+            </a:r>
+            <a:r>
+              <a:rPr lang="fr-FR" dirty="0"/>
+              <a:t> tell if </a:t>
+            </a:r>
+            <a:r>
+              <a:rPr lang="fr-FR" dirty="0" err="1"/>
+              <a:t>you’ve</a:t>
+            </a:r>
+            <a:r>
+              <a:rPr lang="fr-FR" dirty="0"/>
+              <a:t> passing a singleton or a collection </a:t>
+            </a:r>
+            <a:r>
+              <a:rPr lang="fr-FR" dirty="0" err="1"/>
+              <a:t>into</a:t>
+            </a:r>
+            <a:r>
+              <a:rPr lang="fr-FR" dirty="0"/>
+              <a:t> a pipeline</a:t>
             </a:r>
           </a:p>
           <a:p>
             <a:pPr lvl="1"/>
             <a:r>
-              <a:rPr lang="en-US" dirty="0"/>
-              <a:t>The same parameter binder logic is used for all functions.</a:t>
-            </a:r>
-          </a:p>
-          <a:p>
-            <a:r>
-              <a:rPr lang="en-US" dirty="0"/>
+              <a:rPr lang="fr-FR" dirty="0"/>
+              <a:t>Output types of </a:t>
+            </a:r>
+            <a:r>
+              <a:rPr lang="fr-FR" dirty="0" err="1"/>
+              <a:t>functions</a:t>
+            </a:r>
+            <a:r>
+              <a:rPr lang="fr-FR" dirty="0"/>
+              <a:t> are </a:t>
+            </a:r>
+            <a:r>
+              <a:rPr lang="fr-FR" dirty="0" err="1"/>
+              <a:t>just</a:t>
+            </a:r>
+            <a:r>
+              <a:rPr lang="fr-FR" dirty="0"/>
+              <a:t> documentation</a:t>
+            </a:r>
+          </a:p>
+          <a:p>
+            <a:r>
+              <a:rPr lang="fr-FR" dirty="0"/>
               <a:t>Mitigation</a:t>
             </a:r>
           </a:p>
           <a:p>
             <a:pPr lvl="1"/>
             <a:r>
-              <a:rPr lang="en-US" dirty="0"/>
-              <a:t>Use Static methods</a:t>
-            </a:r>
+              <a:rPr lang="fr-FR" dirty="0"/>
+              <a:t>Use </a:t>
+            </a:r>
+            <a:r>
+              <a:rPr lang="fr-FR" i="1" dirty="0"/>
+              <a:t>set-</a:t>
+            </a:r>
+            <a:r>
+              <a:rPr lang="fr-FR" i="1" dirty="0" err="1"/>
+              <a:t>strictmode</a:t>
+            </a:r>
+            <a:r>
+              <a:rPr lang="fr-FR" i="1" dirty="0"/>
+              <a:t> –</a:t>
+            </a:r>
+            <a:r>
+              <a:rPr lang="fr-FR" i="1" dirty="0" err="1"/>
+              <a:t>latest</a:t>
+            </a:r>
+            <a:endParaRPr lang="fr-FR" i="1" dirty="0"/>
+          </a:p>
+          <a:p>
+            <a:pPr lvl="1"/>
+            <a:r>
+              <a:rPr lang="fr-FR" dirty="0"/>
+              <a:t>Methods in classes are </a:t>
+            </a:r>
+            <a:r>
+              <a:rPr lang="fr-FR" dirty="0" err="1"/>
+              <a:t>strongly</a:t>
+            </a:r>
+            <a:r>
+              <a:rPr lang="fr-FR" dirty="0"/>
+              <a:t> </a:t>
+            </a:r>
+            <a:r>
+              <a:rPr lang="fr-FR" dirty="0" err="1"/>
+              <a:t>typed</a:t>
+            </a:r>
+            <a:r>
+              <a:rPr lang="fr-FR" dirty="0"/>
+              <a:t> and return types are </a:t>
+            </a:r>
+            <a:r>
+              <a:rPr lang="fr-FR" dirty="0" err="1"/>
+              <a:t>enforced</a:t>
+            </a:r>
+            <a:endParaRPr lang="fr-FR" dirty="0"/>
           </a:p>
         </p:txBody>
       </p:sp>
     </p:spTree>
     <p:extLst>
       <p:ext uri="{BB962C8B-B14F-4D97-AF65-F5344CB8AC3E}">
-        <p14:creationId xmlns:p14="http://schemas.microsoft.com/office/powerpoint/2010/main" val="1539615972"/>
+        <p14:creationId xmlns:p14="http://schemas.microsoft.com/office/powerpoint/2010/main" val="676311950"/>
       </p:ext>
     </p:extLst>
   </p:cSld>
@@ -9782,30 +9926,17 @@
         </p:nvSpPr>
         <p:spPr/>
         <p:txBody>
-          <a:bodyPr>
-            <a:normAutofit/>
-          </a:bodyPr>
+          <a:bodyPr/>
           <a:lstStyle/>
           <a:p>
             <a:r>
+              <a:rPr lang="en-US" dirty="0" err="1"/>
+              <a:t>Challange</a:t>
+            </a:r>
+            <a:r>
               <a:rPr lang="en-US" dirty="0"/>
-              <a:t>Example: </a:t>
-            </a:r>
-            <a:r>
-              <a:rPr lang="en-US" i="1" dirty="0">
-                <a:latin typeface="Cascadia Code" panose="020B0609020000020004" pitchFamily="49" charset="0"/>
-                <a:cs typeface="Cascadia Code" panose="020B0609020000020004" pitchFamily="49" charset="0"/>
-              </a:rPr>
-              <a:t>fib</a:t>
-            </a:r>
-            <a:r>
-              <a:rPr lang="en-US" dirty="0">
-                <a:latin typeface="Cascadia Code" panose="020B0609020000020004" pitchFamily="49" charset="0"/>
-                <a:cs typeface="Cascadia Code" panose="020B0609020000020004" pitchFamily="49" charset="0"/>
-              </a:rPr>
-              <a:t> function</a:t>
-            </a:r>
-            <a:endParaRPr lang="en-US" dirty="0"/>
+              <a:t> 4</a:t>
+            </a:r>
           </a:p>
         </p:txBody>
       </p:sp>
@@ -9827,288 +9958,39 @@
         </p:nvSpPr>
         <p:spPr/>
         <p:txBody>
-          <a:bodyPr>
-            <a:normAutofit/>
-          </a:bodyPr>
+          <a:bodyPr/>
           <a:lstStyle/>
           <a:p>
-            <a:pPr marL="0" indent="0">
-              <a:lnSpc>
-                <a:spcPct val="120000"/>
-              </a:lnSpc>
-              <a:spcBef>
-                <a:spcPts val="0"/>
-              </a:spcBef>
-              <a:buNone/>
-            </a:pPr>
-            <a:r>
-              <a:rPr lang="en-US" sz="1800" dirty="0">
-                <a:latin typeface="Cascadia Code" panose="020B0609020000020004" pitchFamily="49" charset="0"/>
-                <a:cs typeface="Cascadia Code" panose="020B0609020000020004" pitchFamily="49" charset="0"/>
-              </a:rPr>
-              <a:t>function </a:t>
-            </a:r>
-            <a:r>
-              <a:rPr lang="en-US" sz="1800" dirty="0" err="1">
-                <a:latin typeface="Cascadia Code" panose="020B0609020000020004" pitchFamily="49" charset="0"/>
-                <a:cs typeface="Cascadia Code" panose="020B0609020000020004" pitchFamily="49" charset="0"/>
-              </a:rPr>
-              <a:t>psfib</a:t>
-            </a:r>
-            <a:endParaRPr lang="en-US" sz="1800" dirty="0">
-              <a:latin typeface="Cascadia Code" panose="020B0609020000020004" pitchFamily="49" charset="0"/>
-              <a:cs typeface="Cascadia Code" panose="020B0609020000020004" pitchFamily="49" charset="0"/>
-            </a:endParaRPr>
-          </a:p>
-          <a:p>
-            <a:pPr marL="0" indent="0">
-              <a:lnSpc>
-                <a:spcPct val="120000"/>
-              </a:lnSpc>
-              <a:spcBef>
-                <a:spcPts val="0"/>
-              </a:spcBef>
-              <a:buNone/>
-            </a:pPr>
-            <a:r>
-              <a:rPr lang="en-US" sz="1800" dirty="0">
-                <a:latin typeface="Cascadia Code" panose="020B0609020000020004" pitchFamily="49" charset="0"/>
-                <a:cs typeface="Cascadia Code" panose="020B0609020000020004" pitchFamily="49" charset="0"/>
-              </a:rPr>
-              <a:t>{</a:t>
-            </a:r>
-          </a:p>
-          <a:p>
-            <a:pPr marL="0" indent="0">
-              <a:lnSpc>
-                <a:spcPct val="120000"/>
-              </a:lnSpc>
-              <a:spcBef>
-                <a:spcPts val="0"/>
-              </a:spcBef>
-              <a:buNone/>
-            </a:pPr>
-            <a:r>
-              <a:rPr lang="en-US" sz="1800" dirty="0">
-                <a:latin typeface="Cascadia Code" panose="020B0609020000020004" pitchFamily="49" charset="0"/>
-                <a:cs typeface="Cascadia Code" panose="020B0609020000020004" pitchFamily="49" charset="0"/>
-              </a:rPr>
-              <a:t>    [</a:t>
-            </a:r>
-            <a:r>
-              <a:rPr lang="en-US" sz="1800" dirty="0" err="1">
-                <a:latin typeface="Cascadia Code" panose="020B0609020000020004" pitchFamily="49" charset="0"/>
-                <a:cs typeface="Cascadia Code" panose="020B0609020000020004" pitchFamily="49" charset="0"/>
-              </a:rPr>
-              <a:t>CmdletBinding</a:t>
-            </a:r>
-            <a:r>
-              <a:rPr lang="en-US" sz="1800" dirty="0">
-                <a:latin typeface="Cascadia Code" panose="020B0609020000020004" pitchFamily="49" charset="0"/>
-                <a:cs typeface="Cascadia Code" panose="020B0609020000020004" pitchFamily="49" charset="0"/>
-              </a:rPr>
-              <a:t>()]</a:t>
-            </a:r>
-          </a:p>
-          <a:p>
-            <a:pPr marL="0" indent="0">
-              <a:lnSpc>
-                <a:spcPct val="120000"/>
-              </a:lnSpc>
-              <a:spcBef>
-                <a:spcPts val="0"/>
-              </a:spcBef>
-              <a:buNone/>
-            </a:pPr>
-            <a:r>
-              <a:rPr lang="en-US" sz="1800" dirty="0">
-                <a:latin typeface="Cascadia Code" panose="020B0609020000020004" pitchFamily="49" charset="0"/>
-                <a:cs typeface="Cascadia Code" panose="020B0609020000020004" pitchFamily="49" charset="0"/>
-              </a:rPr>
-              <a:t>    param ( $num )</a:t>
-            </a:r>
-          </a:p>
-          <a:p>
-            <a:pPr marL="0" indent="0">
-              <a:lnSpc>
-                <a:spcPct val="120000"/>
-              </a:lnSpc>
-              <a:spcBef>
-                <a:spcPts val="0"/>
-              </a:spcBef>
-              <a:buNone/>
-            </a:pPr>
-            <a:r>
-              <a:rPr lang="en-US" sz="1800" dirty="0">
-                <a:latin typeface="Cascadia Code" panose="020B0609020000020004" pitchFamily="49" charset="0"/>
-                <a:cs typeface="Cascadia Code" panose="020B0609020000020004" pitchFamily="49" charset="0"/>
-              </a:rPr>
-              <a:t>    if ($num -</a:t>
-            </a:r>
-            <a:r>
-              <a:rPr lang="en-US" sz="1800" dirty="0" err="1">
-                <a:latin typeface="Cascadia Code" panose="020B0609020000020004" pitchFamily="49" charset="0"/>
-                <a:cs typeface="Cascadia Code" panose="020B0609020000020004" pitchFamily="49" charset="0"/>
-              </a:rPr>
-              <a:t>lt</a:t>
-            </a:r>
-            <a:r>
-              <a:rPr lang="en-US" sz="1800" dirty="0">
-                <a:latin typeface="Cascadia Code" panose="020B0609020000020004" pitchFamily="49" charset="0"/>
-                <a:cs typeface="Cascadia Code" panose="020B0609020000020004" pitchFamily="49" charset="0"/>
-              </a:rPr>
-              <a:t> 2) {</a:t>
-            </a:r>
-          </a:p>
-          <a:p>
-            <a:pPr marL="0" indent="0">
-              <a:lnSpc>
-                <a:spcPct val="120000"/>
-              </a:lnSpc>
-              <a:spcBef>
-                <a:spcPts val="0"/>
-              </a:spcBef>
-              <a:buNone/>
-            </a:pPr>
-            <a:r>
-              <a:rPr lang="en-US" sz="1800" dirty="0">
-                <a:latin typeface="Cascadia Code" panose="020B0609020000020004" pitchFamily="49" charset="0"/>
-                <a:cs typeface="Cascadia Code" panose="020B0609020000020004" pitchFamily="49" charset="0"/>
-              </a:rPr>
-              <a:t>        return 1</a:t>
-            </a:r>
-          </a:p>
-          <a:p>
-            <a:pPr marL="0" indent="0">
-              <a:lnSpc>
-                <a:spcPct val="120000"/>
-              </a:lnSpc>
-              <a:spcBef>
-                <a:spcPts val="0"/>
-              </a:spcBef>
-              <a:buNone/>
-            </a:pPr>
-            <a:r>
-              <a:rPr lang="en-US" sz="1800" dirty="0">
-                <a:latin typeface="Cascadia Code" panose="020B0609020000020004" pitchFamily="49" charset="0"/>
-                <a:cs typeface="Cascadia Code" panose="020B0609020000020004" pitchFamily="49" charset="0"/>
-              </a:rPr>
-              <a:t>    }</a:t>
-            </a:r>
-          </a:p>
-          <a:p>
-            <a:pPr marL="0" indent="0">
-              <a:lnSpc>
-                <a:spcPct val="120000"/>
-              </a:lnSpc>
-              <a:spcBef>
-                <a:spcPts val="0"/>
-              </a:spcBef>
-              <a:buNone/>
-            </a:pPr>
-            <a:endParaRPr lang="en-US" sz="1800" dirty="0">
-              <a:latin typeface="Cascadia Code" panose="020B0609020000020004" pitchFamily="49" charset="0"/>
-              <a:cs typeface="Cascadia Code" panose="020B0609020000020004" pitchFamily="49" charset="0"/>
-            </a:endParaRPr>
-          </a:p>
-          <a:p>
-            <a:pPr marL="0" indent="0">
-              <a:lnSpc>
-                <a:spcPct val="120000"/>
-              </a:lnSpc>
-              <a:spcBef>
-                <a:spcPts val="0"/>
-              </a:spcBef>
-              <a:buNone/>
-            </a:pPr>
-            <a:r>
-              <a:rPr lang="en-US" sz="1800" dirty="0">
-                <a:latin typeface="Cascadia Code" panose="020B0609020000020004" pitchFamily="49" charset="0"/>
-                <a:cs typeface="Cascadia Code" panose="020B0609020000020004" pitchFamily="49" charset="0"/>
-              </a:rPr>
-              <a:t>    # decrement operator means second</a:t>
-            </a:r>
-          </a:p>
-          <a:p>
-            <a:pPr marL="0" indent="0">
-              <a:lnSpc>
-                <a:spcPct val="120000"/>
-              </a:lnSpc>
-              <a:spcBef>
-                <a:spcPts val="0"/>
-              </a:spcBef>
-              <a:buNone/>
-            </a:pPr>
-            <a:r>
-              <a:rPr lang="en-US" sz="1800" dirty="0">
-                <a:latin typeface="Cascadia Code" panose="020B0609020000020004" pitchFamily="49" charset="0"/>
-                <a:cs typeface="Cascadia Code" panose="020B0609020000020004" pitchFamily="49" charset="0"/>
-              </a:rPr>
-              <a:t>    # call is $num-2</a:t>
-            </a:r>
-          </a:p>
-          <a:p>
-            <a:pPr marL="0" indent="0">
-              <a:lnSpc>
-                <a:spcPct val="120000"/>
-              </a:lnSpc>
-              <a:spcBef>
-                <a:spcPts val="0"/>
-              </a:spcBef>
-              <a:buNone/>
-            </a:pPr>
-            <a:r>
-              <a:rPr lang="en-US" sz="1800" dirty="0">
-                <a:latin typeface="Cascadia Code" panose="020B0609020000020004" pitchFamily="49" charset="0"/>
-                <a:cs typeface="Cascadia Code" panose="020B0609020000020004" pitchFamily="49" charset="0"/>
-              </a:rPr>
-              <a:t>    (</a:t>
-            </a:r>
-            <a:r>
-              <a:rPr lang="en-US" sz="1800" dirty="0" err="1">
-                <a:latin typeface="Cascadia Code" panose="020B0609020000020004" pitchFamily="49" charset="0"/>
-                <a:cs typeface="Cascadia Code" panose="020B0609020000020004" pitchFamily="49" charset="0"/>
-              </a:rPr>
-              <a:t>psfib</a:t>
-            </a:r>
-            <a:r>
-              <a:rPr lang="en-US" sz="1800" dirty="0">
-                <a:latin typeface="Cascadia Code" panose="020B0609020000020004" pitchFamily="49" charset="0"/>
-                <a:cs typeface="Cascadia Code" panose="020B0609020000020004" pitchFamily="49" charset="0"/>
-              </a:rPr>
-              <a:t> ($num-1)) + (</a:t>
-            </a:r>
-            <a:r>
-              <a:rPr lang="en-US" sz="1800" dirty="0" err="1">
-                <a:latin typeface="Cascadia Code" panose="020B0609020000020004" pitchFamily="49" charset="0"/>
-                <a:cs typeface="Cascadia Code" panose="020B0609020000020004" pitchFamily="49" charset="0"/>
-              </a:rPr>
-              <a:t>psfib</a:t>
-            </a:r>
-            <a:r>
-              <a:rPr lang="en-US" sz="1800" dirty="0">
-                <a:latin typeface="Cascadia Code" panose="020B0609020000020004" pitchFamily="49" charset="0"/>
-                <a:cs typeface="Cascadia Code" panose="020B0609020000020004" pitchFamily="49" charset="0"/>
-              </a:rPr>
-              <a:t> ($num-2))</a:t>
-            </a:r>
-          </a:p>
-          <a:p>
-            <a:pPr marL="0" indent="0">
-              <a:lnSpc>
-                <a:spcPct val="120000"/>
-              </a:lnSpc>
-              <a:spcBef>
-                <a:spcPts val="0"/>
-              </a:spcBef>
-              <a:buNone/>
-            </a:pPr>
-            <a:r>
-              <a:rPr lang="en-US" sz="1800" dirty="0">
-                <a:latin typeface="Cascadia Code" panose="020B0609020000020004" pitchFamily="49" charset="0"/>
-                <a:cs typeface="Cascadia Code" panose="020B0609020000020004" pitchFamily="49" charset="0"/>
-              </a:rPr>
-              <a:t>}</a:t>
+            <a:r>
+              <a:rPr lang="en-US" dirty="0"/>
+              <a:t>Performance</a:t>
+            </a:r>
+          </a:p>
+          <a:p>
+            <a:pPr lvl="1"/>
+            <a:r>
+              <a:rPr lang="en-US" dirty="0"/>
+              <a:t>PowerShell function invocation is *slow*</a:t>
+            </a:r>
+          </a:p>
+          <a:p>
+            <a:pPr lvl="1"/>
+            <a:r>
+              <a:rPr lang="en-US" dirty="0"/>
+              <a:t>The same parameter binder logic is used for all functions.</a:t>
+            </a:r>
+          </a:p>
+          <a:p>
+            <a:r>
+              <a:rPr lang="en-US" dirty="0"/>
+              <a:t>Mitigation</a:t>
+            </a:r>
+          </a:p>
+          <a:p>
+            <a:pPr lvl="1"/>
+            <a:r>
+              <a:rPr lang="en-US" dirty="0"/>
+              <a:t>Use Static methods</a:t>
             </a:r>
           </a:p>
         </p:txBody>
@@ -10116,7 +9998,7 @@
     </p:spTree>
     <p:extLst>
       <p:ext uri="{BB962C8B-B14F-4D97-AF65-F5344CB8AC3E}">
-        <p14:creationId xmlns:p14="http://schemas.microsoft.com/office/powerpoint/2010/main" val="4279933795"/>
+        <p14:creationId xmlns:p14="http://schemas.microsoft.com/office/powerpoint/2010/main" val="1539615972"/>
       </p:ext>
     </p:extLst>
   </p:cSld>
@@ -10175,12 +10057,16 @@
                 <a:latin typeface="Cascadia Code" panose="020B0609020000020004" pitchFamily="49" charset="0"/>
                 <a:cs typeface="Cascadia Code" panose="020B0609020000020004" pitchFamily="49" charset="0"/>
               </a:rPr>
-              <a:t>fib() </a:t>
-            </a:r>
-            <a:r>
-              <a:rPr lang="en-US" dirty="0"/>
-              <a:t>static method</a:t>
-            </a:r>
+              <a:t>fib</a:t>
+            </a:r>
+            <a:r>
+              <a:rPr lang="en-US" dirty="0">
+                <a:latin typeface="Cascadia Code" panose="020B0609020000020004" pitchFamily="49" charset="0"/>
+                <a:cs typeface="Cascadia Code" panose="020B0609020000020004" pitchFamily="49" charset="0"/>
+              </a:rPr>
+              <a:t> function</a:t>
+            </a:r>
+            <a:endParaRPr lang="en-US" dirty="0"/>
           </a:p>
         </p:txBody>
       </p:sp>
@@ -10203,7 +10089,7 @@
         <p:spPr/>
         <p:txBody>
           <a:bodyPr>
-            <a:normAutofit fontScale="92500" lnSpcReduction="10000"/>
+            <a:normAutofit/>
           </a:bodyPr>
           <a:lstStyle/>
           <a:p>
@@ -10221,14 +10107,14 @@
                 <a:latin typeface="Cascadia Code" panose="020B0609020000020004" pitchFamily="49" charset="0"/>
                 <a:cs typeface="Cascadia Code" panose="020B0609020000020004" pitchFamily="49" charset="0"/>
               </a:rPr>
-              <a:t>class </a:t>
+              <a:t>function </a:t>
             </a:r>
             <a:r>
               <a:rPr lang="en-US" sz="1800" dirty="0" err="1">
                 <a:latin typeface="Cascadia Code" panose="020B0609020000020004" pitchFamily="49" charset="0"/>
                 <a:cs typeface="Cascadia Code" panose="020B0609020000020004" pitchFamily="49" charset="0"/>
               </a:rPr>
-              <a:t>fibclass</a:t>
+              <a:t>psfib</a:t>
             </a:r>
             <a:endParaRPr lang="en-US" sz="1800" dirty="0">
               <a:latin typeface="Cascadia Code" panose="020B0609020000020004" pitchFamily="49" charset="0"/>
@@ -10268,7 +10154,21 @@
                 <a:latin typeface="Cascadia Code" panose="020B0609020000020004" pitchFamily="49" charset="0"/>
                 <a:cs typeface="Cascadia Code" panose="020B0609020000020004" pitchFamily="49" charset="0"/>
               </a:rPr>
-              <a:t>    static [int] fib($n)</a:t>
+              <a:t>    [</a:t>
+            </a:r>
+            <a:r>
+              <a:rPr lang="en-US" sz="1800" dirty="0" err="1">
+                <a:latin typeface="Cascadia Code" panose="020B0609020000020004" pitchFamily="49" charset="0"/>
+                <a:cs typeface="Cascadia Code" panose="020B0609020000020004" pitchFamily="49" charset="0"/>
+              </a:rPr>
+              <a:t>CmdletBinding</a:t>
+            </a:r>
+            <a:r>
+              <a:rPr lang="en-US" sz="1800" dirty="0">
+                <a:latin typeface="Cascadia Code" panose="020B0609020000020004" pitchFamily="49" charset="0"/>
+                <a:cs typeface="Cascadia Code" panose="020B0609020000020004" pitchFamily="49" charset="0"/>
+              </a:rPr>
+              <a:t>()]</a:t>
             </a:r>
           </a:p>
           <a:p>
@@ -10286,7 +10186,7 @@
                 <a:latin typeface="Cascadia Code" panose="020B0609020000020004" pitchFamily="49" charset="0"/>
                 <a:cs typeface="Cascadia Code" panose="020B0609020000020004" pitchFamily="49" charset="0"/>
               </a:rPr>
-              <a:t>    {</a:t>
+              <a:t>    param ( $num )</a:t>
             </a:r>
           </a:p>
           <a:p>
@@ -10304,7 +10204,7 @@
                 <a:latin typeface="Cascadia Code" panose="020B0609020000020004" pitchFamily="49" charset="0"/>
                 <a:cs typeface="Cascadia Code" panose="020B0609020000020004" pitchFamily="49" charset="0"/>
               </a:rPr>
-              <a:t>        if ($n -</a:t>
+              <a:t>    if ($num -</a:t>
             </a:r>
             <a:r>
               <a:rPr lang="en-US" sz="1800" dirty="0" err="1">
@@ -10318,7 +10218,7 @@
                 <a:latin typeface="Cascadia Code" panose="020B0609020000020004" pitchFamily="49" charset="0"/>
                 <a:cs typeface="Cascadia Code" panose="020B0609020000020004" pitchFamily="49" charset="0"/>
               </a:rPr>
-              <a:t> 2)</a:t>
+              <a:t> 2) {</a:t>
             </a:r>
           </a:p>
           <a:p>
@@ -10336,7 +10236,7 @@
                 <a:latin typeface="Cascadia Code" panose="020B0609020000020004" pitchFamily="49" charset="0"/>
                 <a:cs typeface="Cascadia Code" panose="020B0609020000020004" pitchFamily="49" charset="0"/>
               </a:rPr>
-              <a:t>        {</a:t>
+              <a:t>        return 1</a:t>
             </a:r>
           </a:p>
           <a:p>
@@ -10354,7 +10254,7 @@
                 <a:latin typeface="Cascadia Code" panose="020B0609020000020004" pitchFamily="49" charset="0"/>
                 <a:cs typeface="Cascadia Code" panose="020B0609020000020004" pitchFamily="49" charset="0"/>
               </a:rPr>
-              <a:t>            return 1</a:t>
+              <a:t>    }</a:t>
             </a:r>
           </a:p>
           <a:p>
@@ -10367,13 +10267,10 @@
               </a:spcBef>
               <a:buNone/>
             </a:pPr>
-            <a:r>
-              <a:rPr lang="en-US" sz="1800" dirty="0">
-                <a:latin typeface="Cascadia Code" panose="020B0609020000020004" pitchFamily="49" charset="0"/>
-                <a:cs typeface="Cascadia Code" panose="020B0609020000020004" pitchFamily="49" charset="0"/>
-              </a:rPr>
-              <a:t>        } </a:t>
-            </a:r>
+            <a:endParaRPr lang="en-US" sz="1800" dirty="0">
+              <a:latin typeface="Cascadia Code" panose="020B0609020000020004" pitchFamily="49" charset="0"/>
+              <a:cs typeface="Cascadia Code" panose="020B0609020000020004" pitchFamily="49" charset="0"/>
+            </a:endParaRPr>
           </a:p>
           <a:p>
             <a:pPr marL="0" indent="0">
@@ -10390,7 +10287,7 @@
                 <a:latin typeface="Cascadia Code" panose="020B0609020000020004" pitchFamily="49" charset="0"/>
                 <a:cs typeface="Cascadia Code" panose="020B0609020000020004" pitchFamily="49" charset="0"/>
               </a:rPr>
-              <a:t>        else</a:t>
+              <a:t>    # decrement operator means second</a:t>
             </a:r>
           </a:p>
           <a:p>
@@ -10408,7 +10305,7 @@
                 <a:latin typeface="Cascadia Code" panose="020B0609020000020004" pitchFamily="49" charset="0"/>
                 <a:cs typeface="Cascadia Code" panose="020B0609020000020004" pitchFamily="49" charset="0"/>
               </a:rPr>
-              <a:t>        {</a:t>
+              <a:t>    # call is $num-2</a:t>
             </a:r>
           </a:p>
           <a:p>
@@ -10426,35 +10323,35 @@
                 <a:latin typeface="Cascadia Code" panose="020B0609020000020004" pitchFamily="49" charset="0"/>
                 <a:cs typeface="Cascadia Code" panose="020B0609020000020004" pitchFamily="49" charset="0"/>
               </a:rPr>
-              <a:t>            return [</a:t>
+              <a:t>    (</a:t>
             </a:r>
             <a:r>
               <a:rPr lang="en-US" sz="1800" dirty="0" err="1">
                 <a:latin typeface="Cascadia Code" panose="020B0609020000020004" pitchFamily="49" charset="0"/>
                 <a:cs typeface="Cascadia Code" panose="020B0609020000020004" pitchFamily="49" charset="0"/>
               </a:rPr>
-              <a:t>fibclass</a:t>
+              <a:t>psfib</a:t>
             </a:r>
             <a:r>
               <a:rPr lang="en-US" sz="1800" dirty="0">
                 <a:latin typeface="Cascadia Code" panose="020B0609020000020004" pitchFamily="49" charset="0"/>
                 <a:cs typeface="Cascadia Code" panose="020B0609020000020004" pitchFamily="49" charset="0"/>
               </a:rPr>
-              <a:t>]::fib($n-1)+[</a:t>
+              <a:t> ($num-1)) + (</a:t>
             </a:r>
             <a:r>
               <a:rPr lang="en-US" sz="1800" dirty="0" err="1">
                 <a:latin typeface="Cascadia Code" panose="020B0609020000020004" pitchFamily="49" charset="0"/>
                 <a:cs typeface="Cascadia Code" panose="020B0609020000020004" pitchFamily="49" charset="0"/>
               </a:rPr>
-              <a:t>fibclass</a:t>
+              <a:t>psfib</a:t>
             </a:r>
             <a:r>
               <a:rPr lang="en-US" sz="1800" dirty="0">
                 <a:latin typeface="Cascadia Code" panose="020B0609020000020004" pitchFamily="49" charset="0"/>
                 <a:cs typeface="Cascadia Code" panose="020B0609020000020004" pitchFamily="49" charset="0"/>
               </a:rPr>
-              <a:t>]::fib($n-2)</a:t>
+              <a:t> ($num-2))</a:t>
             </a:r>
           </a:p>
           <a:p>
@@ -10472,42 +10369,6 @@
                 <a:latin typeface="Cascadia Code" panose="020B0609020000020004" pitchFamily="49" charset="0"/>
                 <a:cs typeface="Cascadia Code" panose="020B0609020000020004" pitchFamily="49" charset="0"/>
               </a:rPr>
-              <a:t>        }</a:t>
-            </a:r>
-          </a:p>
-          <a:p>
-            <a:pPr marL="0" indent="0">
-              <a:lnSpc>
-                <a:spcPct val="120000"/>
-              </a:lnSpc>
-              <a:spcBef>
-                <a:spcPts val="0"/>
-              </a:spcBef>
-              <a:buNone/>
-            </a:pPr>
-            <a:r>
-              <a:rPr lang="en-US" sz="1800" dirty="0">
-                <a:latin typeface="Cascadia Code" panose="020B0609020000020004" pitchFamily="49" charset="0"/>
-                <a:cs typeface="Cascadia Code" panose="020B0609020000020004" pitchFamily="49" charset="0"/>
-              </a:rPr>
-              <a:t>    }</a:t>
-            </a:r>
-          </a:p>
-          <a:p>
-            <a:pPr marL="0" indent="0">
-              <a:lnSpc>
-                <a:spcPct val="120000"/>
-              </a:lnSpc>
-              <a:spcBef>
-                <a:spcPts val="0"/>
-              </a:spcBef>
-              <a:buNone/>
-            </a:pPr>
-            <a:r>
-              <a:rPr lang="en-US" sz="1800" dirty="0">
-                <a:latin typeface="Cascadia Code" panose="020B0609020000020004" pitchFamily="49" charset="0"/>
-                <a:cs typeface="Cascadia Code" panose="020B0609020000020004" pitchFamily="49" charset="0"/>
-              </a:rPr>
               <a:t>}</a:t>
             </a:r>
           </a:p>
@@ -10516,7 +10377,7 @@
     </p:spTree>
     <p:extLst>
       <p:ext uri="{BB962C8B-B14F-4D97-AF65-F5344CB8AC3E}">
-        <p14:creationId xmlns:p14="http://schemas.microsoft.com/office/powerpoint/2010/main" val="3472863835"/>
+        <p14:creationId xmlns:p14="http://schemas.microsoft.com/office/powerpoint/2010/main" val="4279933795"/>
       </p:ext>
     </p:extLst>
   </p:cSld>
@@ -10568,11 +10429,19 @@
           <a:p>
             <a:r>
               <a:rPr lang="en-US" dirty="0"/>
-              <a:t>Relative performance</a:t>
-            </a:r>
-            <a:endParaRPr lang="en-US" dirty="0">
-              <a:latin typeface="+mn-lt"/>
-            </a:endParaRPr>
+              <a:t>Example: </a:t>
+            </a:r>
+            <a:r>
+              <a:rPr lang="en-US" i="1" dirty="0">
+                <a:latin typeface="Cascadia Code" panose="020B0609020000020004" pitchFamily="49" charset="0"/>
+                <a:cs typeface="Cascadia Code" panose="020B0609020000020004" pitchFamily="49" charset="0"/>
+              </a:rPr>
+              <a:t>fib() </a:t>
+            </a:r>
+            <a:r>
+              <a:rPr lang="en-US" dirty="0"/>
+              <a:t>static method</a:t>
+            </a:r>
           </a:p>
         </p:txBody>
       </p:sp>
@@ -10592,10 +10461,15 @@
             <p:ph idx="1"/>
           </p:nvPr>
         </p:nvSpPr>
-        <p:spPr/>
+        <p:spPr>
+          <a:xfrm>
+            <a:off x="915473" y="1613123"/>
+            <a:ext cx="10515600" cy="4351338"/>
+          </a:xfrm>
+        </p:spPr>
         <p:txBody>
           <a:bodyPr>
-            <a:normAutofit/>
+            <a:normAutofit fontScale="92500" lnSpcReduction="10000"/>
           </a:bodyPr>
           <a:lstStyle/>
           <a:p>
@@ -10609,11 +10483,23 @@
               <a:buNone/>
             </a:pPr>
             <a:r>
-              <a:rPr lang="en-US" sz="3200" dirty="0">
+              <a:rPr lang="en-US" sz="1800" dirty="0">
+                <a:latin typeface="Cascadia Code" panose="020B0609020000020004" pitchFamily="49" charset="0"/>
                 <a:cs typeface="Cascadia Code" panose="020B0609020000020004" pitchFamily="49" charset="0"/>
               </a:rPr>
-              <a:t>Running the function:</a:t>
-            </a:r>
+              <a:t>class </a:t>
+            </a:r>
+            <a:r>
+              <a:rPr lang="en-US" sz="1800" dirty="0" err="1">
+                <a:latin typeface="Cascadia Code" panose="020B0609020000020004" pitchFamily="49" charset="0"/>
+                <a:cs typeface="Cascadia Code" panose="020B0609020000020004" pitchFamily="49" charset="0"/>
+              </a:rPr>
+              <a:t>fibclass</a:t>
+            </a:r>
+            <a:endParaRPr lang="en-US" sz="1800" dirty="0">
+              <a:latin typeface="Cascadia Code" panose="020B0609020000020004" pitchFamily="49" charset="0"/>
+              <a:cs typeface="Cascadia Code" panose="020B0609020000020004" pitchFamily="49" charset="0"/>
+            </a:endParaRPr>
           </a:p>
           <a:p>
             <a:pPr marL="0" indent="0">
@@ -10625,10 +10511,13 @@
               </a:spcBef>
               <a:buNone/>
             </a:pPr>
-            <a:endParaRPr lang="en-US" sz="1800" dirty="0">
-              <a:latin typeface="Cascadia Code" panose="020B0609020000020004" pitchFamily="49" charset="0"/>
-              <a:cs typeface="Cascadia Code" panose="020B0609020000020004" pitchFamily="49" charset="0"/>
-            </a:endParaRPr>
+            <a:r>
+              <a:rPr lang="en-US" sz="1800" dirty="0">
+                <a:latin typeface="Cascadia Code" panose="020B0609020000020004" pitchFamily="49" charset="0"/>
+                <a:cs typeface="Cascadia Code" panose="020B0609020000020004" pitchFamily="49" charset="0"/>
+              </a:rPr>
+              <a:t>{</a:t>
+            </a:r>
           </a:p>
           <a:p>
             <a:pPr marL="0" indent="0">
@@ -10645,47 +10534,8 @@
                 <a:latin typeface="Cascadia Code" panose="020B0609020000020004" pitchFamily="49" charset="0"/>
                 <a:cs typeface="Cascadia Code" panose="020B0609020000020004" pitchFamily="49" charset="0"/>
               </a:rPr>
-              <a:t>{main}</a:t>
-            </a:r>
-            <a:r>
-              <a:rPr lang="en-US" sz="1800" dirty="0" err="1">
-                <a:latin typeface="Cascadia Code" panose="020B0609020000020004" pitchFamily="49" charset="0"/>
-                <a:cs typeface="Cascadia Code" panose="020B0609020000020004" pitchFamily="49" charset="0"/>
-              </a:rPr>
-              <a:t>PSCore</a:t>
-            </a:r>
-            <a:r>
-              <a:rPr lang="en-US" sz="1800" dirty="0">
-                <a:latin typeface="Cascadia Code" panose="020B0609020000020004" pitchFamily="49" charset="0"/>
-                <a:cs typeface="Cascadia Code" panose="020B0609020000020004" pitchFamily="49" charset="0"/>
-              </a:rPr>
-              <a:t> (1:125) &gt;  time {</a:t>
-            </a:r>
-            <a:r>
-              <a:rPr lang="en-US" sz="1800" dirty="0" err="1">
-                <a:latin typeface="Cascadia Code" panose="020B0609020000020004" pitchFamily="49" charset="0"/>
-                <a:cs typeface="Cascadia Code" panose="020B0609020000020004" pitchFamily="49" charset="0"/>
-              </a:rPr>
-              <a:t>psfib</a:t>
-            </a:r>
-            <a:r>
-              <a:rPr lang="en-US" sz="1800" dirty="0">
-                <a:latin typeface="Cascadia Code" panose="020B0609020000020004" pitchFamily="49" charset="0"/>
-                <a:cs typeface="Cascadia Code" panose="020B0609020000020004" pitchFamily="49" charset="0"/>
-              </a:rPr>
-              <a:t> 20} | foreach </a:t>
-            </a:r>
-            <a:r>
-              <a:rPr lang="en-US" sz="1800" dirty="0" err="1">
-                <a:latin typeface="Cascadia Code" panose="020B0609020000020004" pitchFamily="49" charset="0"/>
-                <a:cs typeface="Cascadia Code" panose="020B0609020000020004" pitchFamily="49" charset="0"/>
-              </a:rPr>
-              <a:t>totalmilliseconds</a:t>
-            </a:r>
-            <a:endParaRPr lang="en-US" sz="1800" dirty="0">
-              <a:latin typeface="Cascadia Code" panose="020B0609020000020004" pitchFamily="49" charset="0"/>
-              <a:cs typeface="Cascadia Code" panose="020B0609020000020004" pitchFamily="49" charset="0"/>
-            </a:endParaRPr>
+              <a:t>    static [int] fib($n)</a:t>
+            </a:r>
           </a:p>
           <a:p>
             <a:pPr marL="0" indent="0">
@@ -10699,13 +10549,10 @@
             </a:pPr>
             <a:r>
               <a:rPr lang="en-US" sz="1800" dirty="0">
-                <a:solidFill>
-                  <a:srgbClr val="FF0000"/>
-                </a:solidFill>
                 <a:latin typeface="Cascadia Code" panose="020B0609020000020004" pitchFamily="49" charset="0"/>
                 <a:cs typeface="Cascadia Code" panose="020B0609020000020004" pitchFamily="49" charset="0"/>
               </a:rPr>
-              <a:t>1563.247</a:t>
+              <a:t>    {</a:t>
             </a:r>
           </a:p>
           <a:p>
@@ -10718,13 +10565,27 @@
               </a:spcBef>
               <a:buNone/>
             </a:pPr>
-            <a:endParaRPr lang="en-US" sz="1800" dirty="0">
-              <a:solidFill>
-                <a:srgbClr val="FF0000"/>
-              </a:solidFill>
-              <a:latin typeface="Cascadia Code" panose="020B0609020000020004" pitchFamily="49" charset="0"/>
-              <a:cs typeface="Cascadia Code" panose="020B0609020000020004" pitchFamily="49" charset="0"/>
-            </a:endParaRPr>
+            <a:r>
+              <a:rPr lang="en-US" sz="1800" dirty="0">
+                <a:latin typeface="Cascadia Code" panose="020B0609020000020004" pitchFamily="49" charset="0"/>
+                <a:cs typeface="Cascadia Code" panose="020B0609020000020004" pitchFamily="49" charset="0"/>
+              </a:rPr>
+              <a:t>        if ($n -</a:t>
+            </a:r>
+            <a:r>
+              <a:rPr lang="en-US" sz="1800" dirty="0" err="1">
+                <a:latin typeface="Cascadia Code" panose="020B0609020000020004" pitchFamily="49" charset="0"/>
+                <a:cs typeface="Cascadia Code" panose="020B0609020000020004" pitchFamily="49" charset="0"/>
+              </a:rPr>
+              <a:t>lt</a:t>
+            </a:r>
+            <a:r>
+              <a:rPr lang="en-US" sz="1800" dirty="0">
+                <a:latin typeface="Cascadia Code" panose="020B0609020000020004" pitchFamily="49" charset="0"/>
+                <a:cs typeface="Cascadia Code" panose="020B0609020000020004" pitchFamily="49" charset="0"/>
+              </a:rPr>
+              <a:t> 2)</a:t>
+            </a:r>
           </a:p>
           <a:p>
             <a:pPr marL="0" indent="0">
@@ -10737,10 +10598,11 @@
               <a:buNone/>
             </a:pPr>
             <a:r>
-              <a:rPr lang="en-US" sz="3200" dirty="0">
+              <a:rPr lang="en-US" sz="1800" dirty="0">
+                <a:latin typeface="Cascadia Code" panose="020B0609020000020004" pitchFamily="49" charset="0"/>
                 <a:cs typeface="Cascadia Code" panose="020B0609020000020004" pitchFamily="49" charset="0"/>
               </a:rPr>
-              <a:t>Running the static method implementation:</a:t>
+              <a:t>        {</a:t>
             </a:r>
           </a:p>
           <a:p>
@@ -10753,9 +10615,13 @@
               </a:spcBef>
               <a:buNone/>
             </a:pPr>
-            <a:endParaRPr lang="en-US" sz="1800" dirty="0">
-              <a:cs typeface="Cascadia Code" panose="020B0609020000020004" pitchFamily="49" charset="0"/>
-            </a:endParaRPr>
+            <a:r>
+              <a:rPr lang="en-US" sz="1800" dirty="0">
+                <a:latin typeface="Cascadia Code" panose="020B0609020000020004" pitchFamily="49" charset="0"/>
+                <a:cs typeface="Cascadia Code" panose="020B0609020000020004" pitchFamily="49" charset="0"/>
+              </a:rPr>
+              <a:t>            return 1</a:t>
+            </a:r>
           </a:p>
           <a:p>
             <a:pPr marL="0" indent="0">
@@ -10772,47 +10638,8 @@
                 <a:latin typeface="Cascadia Code" panose="020B0609020000020004" pitchFamily="49" charset="0"/>
                 <a:cs typeface="Cascadia Code" panose="020B0609020000020004" pitchFamily="49" charset="0"/>
               </a:rPr>
-              <a:t>{main}</a:t>
-            </a:r>
-            <a:r>
-              <a:rPr lang="en-US" sz="1800" dirty="0" err="1">
-                <a:latin typeface="Cascadia Code" panose="020B0609020000020004" pitchFamily="49" charset="0"/>
-                <a:cs typeface="Cascadia Code" panose="020B0609020000020004" pitchFamily="49" charset="0"/>
-              </a:rPr>
-              <a:t>PSCore</a:t>
-            </a:r>
-            <a:r>
-              <a:rPr lang="en-US" sz="1800" dirty="0">
-                <a:latin typeface="Cascadia Code" panose="020B0609020000020004" pitchFamily="49" charset="0"/>
-                <a:cs typeface="Cascadia Code" panose="020B0609020000020004" pitchFamily="49" charset="0"/>
-              </a:rPr>
-              <a:t> (1:124) &gt;  time {[</a:t>
-            </a:r>
-            <a:r>
-              <a:rPr lang="en-US" sz="1800" dirty="0" err="1">
-                <a:latin typeface="Cascadia Code" panose="020B0609020000020004" pitchFamily="49" charset="0"/>
-                <a:cs typeface="Cascadia Code" panose="020B0609020000020004" pitchFamily="49" charset="0"/>
-              </a:rPr>
-              <a:t>fibclass</a:t>
-            </a:r>
-            <a:r>
-              <a:rPr lang="en-US" sz="1800" dirty="0">
-                <a:latin typeface="Cascadia Code" panose="020B0609020000020004" pitchFamily="49" charset="0"/>
-                <a:cs typeface="Cascadia Code" panose="020B0609020000020004" pitchFamily="49" charset="0"/>
-              </a:rPr>
-              <a:t>]::fib(20)} | foreach </a:t>
-            </a:r>
-            <a:r>
-              <a:rPr lang="en-US" sz="1800" dirty="0" err="1">
-                <a:latin typeface="Cascadia Code" panose="020B0609020000020004" pitchFamily="49" charset="0"/>
-                <a:cs typeface="Cascadia Code" panose="020B0609020000020004" pitchFamily="49" charset="0"/>
-              </a:rPr>
-              <a:t>totalmilliseconds</a:t>
-            </a:r>
-            <a:endParaRPr lang="en-US" sz="1800" dirty="0">
-              <a:latin typeface="Cascadia Code" panose="020B0609020000020004" pitchFamily="49" charset="0"/>
-              <a:cs typeface="Cascadia Code" panose="020B0609020000020004" pitchFamily="49" charset="0"/>
-            </a:endParaRPr>
+              <a:t>        } </a:t>
+            </a:r>
           </a:p>
           <a:p>
             <a:pPr marL="0" indent="0">
@@ -10826,13 +10653,10 @@
             </a:pPr>
             <a:r>
               <a:rPr lang="en-US" sz="1800" dirty="0">
-                <a:solidFill>
-                  <a:srgbClr val="FF0000"/>
-                </a:solidFill>
                 <a:latin typeface="Cascadia Code" panose="020B0609020000020004" pitchFamily="49" charset="0"/>
                 <a:cs typeface="Cascadia Code" panose="020B0609020000020004" pitchFamily="49" charset="0"/>
               </a:rPr>
-              <a:t>455.7558</a:t>
+              <a:t>        else</a:t>
             </a:r>
           </a:p>
           <a:p>
@@ -10845,20 +10669,120 @@
               </a:spcBef>
               <a:buNone/>
             </a:pPr>
-            <a:endParaRPr lang="en-US" sz="1800" dirty="0">
-              <a:solidFill>
-                <a:srgbClr val="FF0000"/>
-              </a:solidFill>
-              <a:latin typeface="Cascadia Code" panose="020B0609020000020004" pitchFamily="49" charset="0"/>
-              <a:cs typeface="Cascadia Code" panose="020B0609020000020004" pitchFamily="49" charset="0"/>
-            </a:endParaRPr>
+            <a:r>
+              <a:rPr lang="en-US" sz="1800" dirty="0">
+                <a:latin typeface="Cascadia Code" panose="020B0609020000020004" pitchFamily="49" charset="0"/>
+                <a:cs typeface="Cascadia Code" panose="020B0609020000020004" pitchFamily="49" charset="0"/>
+              </a:rPr>
+              <a:t>        {</a:t>
+            </a:r>
+          </a:p>
+          <a:p>
+            <a:pPr marL="0" indent="0">
+              <a:lnSpc>
+                <a:spcPct val="120000"/>
+              </a:lnSpc>
+              <a:spcBef>
+                <a:spcPts val="0"/>
+              </a:spcBef>
+              <a:buNone/>
+            </a:pPr>
+            <a:r>
+              <a:rPr lang="en-US" sz="1800" dirty="0">
+                <a:latin typeface="Cascadia Code" panose="020B0609020000020004" pitchFamily="49" charset="0"/>
+                <a:cs typeface="Cascadia Code" panose="020B0609020000020004" pitchFamily="49" charset="0"/>
+              </a:rPr>
+              <a:t>            return [</a:t>
+            </a:r>
+            <a:r>
+              <a:rPr lang="en-US" sz="1800" dirty="0" err="1">
+                <a:latin typeface="Cascadia Code" panose="020B0609020000020004" pitchFamily="49" charset="0"/>
+                <a:cs typeface="Cascadia Code" panose="020B0609020000020004" pitchFamily="49" charset="0"/>
+              </a:rPr>
+              <a:t>fibclass</a:t>
+            </a:r>
+            <a:r>
+              <a:rPr lang="en-US" sz="1800" dirty="0">
+                <a:latin typeface="Cascadia Code" panose="020B0609020000020004" pitchFamily="49" charset="0"/>
+                <a:cs typeface="Cascadia Code" panose="020B0609020000020004" pitchFamily="49" charset="0"/>
+              </a:rPr>
+              <a:t>]::fib($n-1)+[</a:t>
+            </a:r>
+            <a:r>
+              <a:rPr lang="en-US" sz="1800" dirty="0" err="1">
+                <a:latin typeface="Cascadia Code" panose="020B0609020000020004" pitchFamily="49" charset="0"/>
+                <a:cs typeface="Cascadia Code" panose="020B0609020000020004" pitchFamily="49" charset="0"/>
+              </a:rPr>
+              <a:t>fibclass</a:t>
+            </a:r>
+            <a:r>
+              <a:rPr lang="en-US" sz="1800" dirty="0">
+                <a:latin typeface="Cascadia Code" panose="020B0609020000020004" pitchFamily="49" charset="0"/>
+                <a:cs typeface="Cascadia Code" panose="020B0609020000020004" pitchFamily="49" charset="0"/>
+              </a:rPr>
+              <a:t>]::fib($n-2)</a:t>
+            </a:r>
+          </a:p>
+          <a:p>
+            <a:pPr marL="0" indent="0">
+              <a:lnSpc>
+                <a:spcPct val="120000"/>
+              </a:lnSpc>
+              <a:spcBef>
+                <a:spcPts val="0"/>
+              </a:spcBef>
+              <a:buNone/>
+            </a:pPr>
+            <a:r>
+              <a:rPr lang="en-US" sz="1800" dirty="0">
+                <a:latin typeface="Cascadia Code" panose="020B0609020000020004" pitchFamily="49" charset="0"/>
+                <a:cs typeface="Cascadia Code" panose="020B0609020000020004" pitchFamily="49" charset="0"/>
+              </a:rPr>
+              <a:t>        }</a:t>
+            </a:r>
+          </a:p>
+          <a:p>
+            <a:pPr marL="0" indent="0">
+              <a:lnSpc>
+                <a:spcPct val="120000"/>
+              </a:lnSpc>
+              <a:spcBef>
+                <a:spcPts val="0"/>
+              </a:spcBef>
+              <a:buNone/>
+            </a:pPr>
+            <a:r>
+              <a:rPr lang="en-US" sz="1800" dirty="0">
+                <a:latin typeface="Cascadia Code" panose="020B0609020000020004" pitchFamily="49" charset="0"/>
+                <a:cs typeface="Cascadia Code" panose="020B0609020000020004" pitchFamily="49" charset="0"/>
+              </a:rPr>
+              <a:t>    }</a:t>
+            </a:r>
+          </a:p>
+          <a:p>
+            <a:pPr marL="0" indent="0">
+              <a:lnSpc>
+                <a:spcPct val="120000"/>
+              </a:lnSpc>
+              <a:spcBef>
+                <a:spcPts val="0"/>
+              </a:spcBef>
+              <a:buNone/>
+            </a:pPr>
+            <a:r>
+              <a:rPr lang="en-US" sz="1800" dirty="0">
+                <a:latin typeface="Cascadia Code" panose="020B0609020000020004" pitchFamily="49" charset="0"/>
+                <a:cs typeface="Cascadia Code" panose="020B0609020000020004" pitchFamily="49" charset="0"/>
+              </a:rPr>
+              <a:t>}</a:t>
+            </a:r>
           </a:p>
         </p:txBody>
       </p:sp>
     </p:spTree>
     <p:extLst>
       <p:ext uri="{BB962C8B-B14F-4D97-AF65-F5344CB8AC3E}">
-        <p14:creationId xmlns:p14="http://schemas.microsoft.com/office/powerpoint/2010/main" val="1484412332"/>
+        <p14:creationId xmlns:p14="http://schemas.microsoft.com/office/powerpoint/2010/main" val="3472863835"/>
       </p:ext>
     </p:extLst>
   </p:cSld>
@@ -10887,10 +10811,10 @@
       </p:grpSpPr>
       <p:sp>
         <p:nvSpPr>
-          <p:cNvPr id="2" name="Titre 1">
+          <p:cNvPr id="2" name="Title 1">
             <a:extLst>
               <a:ext uri="{FF2B5EF4-FFF2-40B4-BE49-F238E27FC236}">
-                <a16:creationId xmlns:a16="http://schemas.microsoft.com/office/drawing/2014/main" id="{5191E0F2-FE77-51ED-3F72-223B58926E74}"/>
+                <a16:creationId xmlns:a16="http://schemas.microsoft.com/office/drawing/2014/main" id="{3082E341-7F6E-945D-664B-0026BF1C1366}"/>
               </a:ext>
             </a:extLst>
           </p:cNvPr>
@@ -10903,27 +10827,27 @@
         </p:nvSpPr>
         <p:spPr/>
         <p:txBody>
-          <a:bodyPr/>
+          <a:bodyPr>
+            <a:normAutofit/>
+          </a:bodyPr>
           <a:lstStyle/>
           <a:p>
             <a:r>
-              <a:rPr lang="fr-FR" dirty="0" err="1"/>
-              <a:t>Challange</a:t>
-            </a:r>
-            <a:r>
-              <a:rPr lang="fr-FR" dirty="0"/>
-              <a:t> 5: </a:t>
-            </a:r>
-            <a:endParaRPr lang="en-GB" dirty="0"/>
+              <a:rPr lang="en-US" dirty="0"/>
+              <a:t>Relative performance</a:t>
+            </a:r>
+            <a:endParaRPr lang="en-US" dirty="0">
+              <a:latin typeface="+mn-lt"/>
+            </a:endParaRPr>
           </a:p>
         </p:txBody>
       </p:sp>
       <p:sp>
         <p:nvSpPr>
-          <p:cNvPr id="3" name="Espace réservé du contenu 2">
+          <p:cNvPr id="3" name="Content Placeholder 2">
             <a:extLst>
               <a:ext uri="{FF2B5EF4-FFF2-40B4-BE49-F238E27FC236}">
-                <a16:creationId xmlns:a16="http://schemas.microsoft.com/office/drawing/2014/main" id="{07D5023A-BA6F-B725-CF78-FD889E577EA6}"/>
+                <a16:creationId xmlns:a16="http://schemas.microsoft.com/office/drawing/2014/main" id="{8B103F6A-923C-4BF7-ABF2-0B0896986988}"/>
               </a:ext>
             </a:extLst>
           </p:cNvPr>
@@ -10936,179 +10860,271 @@
         </p:nvSpPr>
         <p:spPr/>
         <p:txBody>
-          <a:bodyPr/>
+          <a:bodyPr>
+            <a:normAutofit/>
+          </a:bodyPr>
           <a:lstStyle/>
           <a:p>
-            <a:pPr>
-              <a:buFont typeface="Wingdings" panose="05000000000000000000" pitchFamily="2" charset="2"/>
-              <a:buChar char="§"/>
+            <a:pPr marL="0" indent="0">
+              <a:lnSpc>
+                <a:spcPct val="120000"/>
+              </a:lnSpc>
+              <a:spcBef>
+                <a:spcPts val="0"/>
+              </a:spcBef>
+              <a:buNone/>
             </a:pPr>
             <a:r>
-              <a:rPr lang="fr-FR" dirty="0" err="1"/>
-              <a:t>Testing</a:t>
-            </a:r>
-            <a:endParaRPr lang="fr-FR" dirty="0"/>
-          </a:p>
-          <a:p>
-            <a:pPr lvl="1"/>
-            <a:r>
-              <a:rPr lang="fr-FR" dirty="0" err="1"/>
-              <a:t>Could</a:t>
-            </a:r>
-            <a:r>
-              <a:rPr lang="fr-FR" dirty="0"/>
-              <a:t> have </a:t>
-            </a:r>
-            <a:r>
-              <a:rPr lang="fr-FR" dirty="0" err="1"/>
-              <a:t>used</a:t>
-            </a:r>
-            <a:r>
-              <a:rPr lang="fr-FR" dirty="0"/>
-              <a:t> </a:t>
-            </a:r>
-            <a:r>
-              <a:rPr lang="fr-FR" i="1" dirty="0"/>
-              <a:t>Pester</a:t>
-            </a:r>
-            <a:r>
-              <a:rPr lang="fr-FR" dirty="0"/>
-              <a:t> but </a:t>
-            </a:r>
-            <a:r>
-              <a:rPr lang="fr-FR" dirty="0" err="1"/>
-              <a:t>it</a:t>
-            </a:r>
-            <a:r>
-              <a:rPr lang="fr-FR" dirty="0"/>
-              <a:t> </a:t>
-            </a:r>
-            <a:r>
-              <a:rPr lang="fr-FR" dirty="0" err="1"/>
-              <a:t>was</a:t>
-            </a:r>
-            <a:r>
-              <a:rPr lang="fr-FR" dirty="0"/>
-              <a:t> </a:t>
-            </a:r>
-            <a:r>
-              <a:rPr lang="fr-FR" dirty="0" err="1"/>
-              <a:t>simpler</a:t>
-            </a:r>
-            <a:r>
-              <a:rPr lang="fr-FR" dirty="0"/>
-              <a:t> to use a </a:t>
-            </a:r>
-            <a:r>
-              <a:rPr lang="fr-FR" dirty="0" err="1"/>
-              <a:t>Tiny</a:t>
-            </a:r>
-            <a:r>
-              <a:rPr lang="fr-FR" dirty="0"/>
-              <a:t> DSL and </a:t>
-            </a:r>
-            <a:r>
-              <a:rPr lang="fr-FR" dirty="0" err="1"/>
-              <a:t>embedded</a:t>
-            </a:r>
-            <a:r>
-              <a:rPr lang="fr-FR" dirty="0"/>
-              <a:t> tests in the source file.</a:t>
-            </a:r>
-          </a:p>
-          <a:p>
-            <a:pPr lvl="2"/>
-            <a:r>
-              <a:rPr lang="fr-FR" i="1" dirty="0" err="1"/>
-              <a:t>tinytest.tiny</a:t>
-            </a:r>
-            <a:r>
-              <a:rPr lang="fr-FR" i="1" dirty="0"/>
-              <a:t> </a:t>
-            </a:r>
-            <a:r>
-              <a:rPr lang="fr-FR" dirty="0" err="1"/>
-              <a:t>extracts</a:t>
-            </a:r>
-            <a:r>
-              <a:rPr lang="fr-FR" dirty="0"/>
-              <a:t> and runs the tests</a:t>
-            </a:r>
-          </a:p>
-          <a:p>
-            <a:r>
-              <a:rPr lang="fr-FR" dirty="0"/>
-              <a:t>Documentation</a:t>
-            </a:r>
-          </a:p>
-          <a:p>
-            <a:pPr lvl="1"/>
-            <a:r>
-              <a:rPr lang="fr-FR" dirty="0"/>
-              <a:t>Documentation </a:t>
-            </a:r>
-            <a:r>
-              <a:rPr lang="fr-FR" dirty="0" err="1"/>
-              <a:t>is</a:t>
-            </a:r>
-            <a:r>
-              <a:rPr lang="fr-FR" dirty="0"/>
-              <a:t> </a:t>
-            </a:r>
-            <a:r>
-              <a:rPr lang="fr-FR" dirty="0" err="1"/>
-              <a:t>embedded</a:t>
-            </a:r>
-            <a:r>
-              <a:rPr lang="fr-FR" dirty="0"/>
-              <a:t> in the tiny.ps1 source file</a:t>
-            </a:r>
-          </a:p>
-          <a:p>
-            <a:pPr lvl="2"/>
-            <a:r>
-              <a:rPr lang="fr-FR" i="1" dirty="0" err="1"/>
-              <a:t>tinydoc.tiny</a:t>
-            </a:r>
-            <a:r>
-              <a:rPr lang="fr-FR" i="1" dirty="0"/>
-              <a:t> </a:t>
-            </a:r>
-            <a:r>
-              <a:rPr lang="fr-FR" dirty="0" err="1"/>
-              <a:t>extracts</a:t>
-            </a:r>
-            <a:r>
-              <a:rPr lang="fr-FR" dirty="0"/>
-              <a:t> and </a:t>
-            </a:r>
-            <a:r>
-              <a:rPr lang="fr-FR" dirty="0" err="1"/>
-              <a:t>builds</a:t>
-            </a:r>
-            <a:r>
-              <a:rPr lang="fr-FR" dirty="0"/>
-              <a:t> the « </a:t>
-            </a:r>
-            <a:r>
-              <a:rPr lang="fr-FR" dirty="0" err="1"/>
-              <a:t>Tiny</a:t>
-            </a:r>
-            <a:r>
-              <a:rPr lang="fr-FR" dirty="0"/>
-              <a:t> Documentation.html » file.</a:t>
-            </a:r>
-          </a:p>
-          <a:p>
-            <a:pPr lvl="2"/>
-            <a:endParaRPr lang="fr-FR" dirty="0"/>
+              <a:rPr lang="en-US" sz="3200" dirty="0">
+                <a:cs typeface="Cascadia Code" panose="020B0609020000020004" pitchFamily="49" charset="0"/>
+              </a:rPr>
+              <a:t>Running the function:</a:t>
+            </a:r>
+          </a:p>
+          <a:p>
+            <a:pPr marL="0" indent="0">
+              <a:lnSpc>
+                <a:spcPct val="120000"/>
+              </a:lnSpc>
+              <a:spcBef>
+                <a:spcPts val="0"/>
+              </a:spcBef>
+              <a:buNone/>
+            </a:pPr>
+            <a:endParaRPr lang="en-US" sz="1800" dirty="0">
+              <a:latin typeface="Cascadia Code" panose="020B0609020000020004" pitchFamily="49" charset="0"/>
+              <a:cs typeface="Cascadia Code" panose="020B0609020000020004" pitchFamily="49" charset="0"/>
+            </a:endParaRPr>
+          </a:p>
+          <a:p>
+            <a:pPr marL="0" indent="0">
+              <a:lnSpc>
+                <a:spcPct val="120000"/>
+              </a:lnSpc>
+              <a:spcBef>
+                <a:spcPts val="0"/>
+              </a:spcBef>
+              <a:buNone/>
+            </a:pPr>
+            <a:r>
+              <a:rPr lang="en-US" sz="1800" dirty="0">
+                <a:latin typeface="Cascadia Code" panose="020B0609020000020004" pitchFamily="49" charset="0"/>
+                <a:cs typeface="Cascadia Code" panose="020B0609020000020004" pitchFamily="49" charset="0"/>
+              </a:rPr>
+              <a:t>{main}</a:t>
+            </a:r>
+            <a:r>
+              <a:rPr lang="en-US" sz="1800" dirty="0" err="1">
+                <a:latin typeface="Cascadia Code" panose="020B0609020000020004" pitchFamily="49" charset="0"/>
+                <a:cs typeface="Cascadia Code" panose="020B0609020000020004" pitchFamily="49" charset="0"/>
+              </a:rPr>
+              <a:t>PSCore</a:t>
+            </a:r>
+            <a:r>
+              <a:rPr lang="en-US" sz="1800" dirty="0">
+                <a:latin typeface="Cascadia Code" panose="020B0609020000020004" pitchFamily="49" charset="0"/>
+                <a:cs typeface="Cascadia Code" panose="020B0609020000020004" pitchFamily="49" charset="0"/>
+              </a:rPr>
+              <a:t> (1:125) &gt;  time {</a:t>
+            </a:r>
+            <a:r>
+              <a:rPr lang="en-US" sz="1800" dirty="0" err="1">
+                <a:latin typeface="Cascadia Code" panose="020B0609020000020004" pitchFamily="49" charset="0"/>
+                <a:cs typeface="Cascadia Code" panose="020B0609020000020004" pitchFamily="49" charset="0"/>
+              </a:rPr>
+              <a:t>psfib</a:t>
+            </a:r>
+            <a:r>
+              <a:rPr lang="en-US" sz="1800" dirty="0">
+                <a:latin typeface="Cascadia Code" panose="020B0609020000020004" pitchFamily="49" charset="0"/>
+                <a:cs typeface="Cascadia Code" panose="020B0609020000020004" pitchFamily="49" charset="0"/>
+              </a:rPr>
+              <a:t> 20} | foreach </a:t>
+            </a:r>
+            <a:r>
+              <a:rPr lang="en-US" sz="1800" dirty="0" err="1">
+                <a:latin typeface="Cascadia Code" panose="020B0609020000020004" pitchFamily="49" charset="0"/>
+                <a:cs typeface="Cascadia Code" panose="020B0609020000020004" pitchFamily="49" charset="0"/>
+              </a:rPr>
+              <a:t>totalmilliseconds</a:t>
+            </a:r>
+            <a:endParaRPr lang="en-US" sz="1800" dirty="0">
+              <a:latin typeface="Cascadia Code" panose="020B0609020000020004" pitchFamily="49" charset="0"/>
+              <a:cs typeface="Cascadia Code" panose="020B0609020000020004" pitchFamily="49" charset="0"/>
+            </a:endParaRPr>
+          </a:p>
+          <a:p>
+            <a:pPr marL="0" indent="0">
+              <a:lnSpc>
+                <a:spcPct val="120000"/>
+              </a:lnSpc>
+              <a:spcBef>
+                <a:spcPts val="0"/>
+              </a:spcBef>
+              <a:buNone/>
+            </a:pPr>
+            <a:r>
+              <a:rPr lang="en-US" sz="1800" dirty="0">
+                <a:solidFill>
+                  <a:srgbClr val="FF0000"/>
+                </a:solidFill>
+                <a:latin typeface="Cascadia Code" panose="020B0609020000020004" pitchFamily="49" charset="0"/>
+                <a:cs typeface="Cascadia Code" panose="020B0609020000020004" pitchFamily="49" charset="0"/>
+              </a:rPr>
+              <a:t>1563.247</a:t>
+            </a:r>
+          </a:p>
+          <a:p>
+            <a:pPr marL="0" indent="0">
+              <a:lnSpc>
+                <a:spcPct val="120000"/>
+              </a:lnSpc>
+              <a:spcBef>
+                <a:spcPts val="0"/>
+              </a:spcBef>
+              <a:buNone/>
+            </a:pPr>
+            <a:endParaRPr lang="en-US" sz="1800" dirty="0">
+              <a:solidFill>
+                <a:srgbClr val="FF0000"/>
+              </a:solidFill>
+              <a:latin typeface="Cascadia Code" panose="020B0609020000020004" pitchFamily="49" charset="0"/>
+              <a:cs typeface="Cascadia Code" panose="020B0609020000020004" pitchFamily="49" charset="0"/>
+            </a:endParaRPr>
+          </a:p>
+          <a:p>
+            <a:pPr marL="0" indent="0">
+              <a:lnSpc>
+                <a:spcPct val="120000"/>
+              </a:lnSpc>
+              <a:spcBef>
+                <a:spcPts val="0"/>
+              </a:spcBef>
+              <a:buNone/>
+            </a:pPr>
+            <a:r>
+              <a:rPr lang="en-US" sz="3200" dirty="0">
+                <a:cs typeface="Cascadia Code" panose="020B0609020000020004" pitchFamily="49" charset="0"/>
+              </a:rPr>
+              <a:t>Running the static method implementation:</a:t>
+            </a:r>
+          </a:p>
+          <a:p>
+            <a:pPr marL="0" indent="0">
+              <a:lnSpc>
+                <a:spcPct val="120000"/>
+              </a:lnSpc>
+              <a:spcBef>
+                <a:spcPts val="0"/>
+              </a:spcBef>
+              <a:buNone/>
+            </a:pPr>
+            <a:endParaRPr lang="en-US" sz="1800" dirty="0">
+              <a:cs typeface="Cascadia Code" panose="020B0609020000020004" pitchFamily="49" charset="0"/>
+            </a:endParaRPr>
+          </a:p>
+          <a:p>
+            <a:pPr marL="0" indent="0">
+              <a:lnSpc>
+                <a:spcPct val="120000"/>
+              </a:lnSpc>
+              <a:spcBef>
+                <a:spcPts val="0"/>
+              </a:spcBef>
+              <a:buNone/>
+            </a:pPr>
+            <a:r>
+              <a:rPr lang="en-US" sz="1800" dirty="0">
+                <a:latin typeface="Cascadia Code" panose="020B0609020000020004" pitchFamily="49" charset="0"/>
+                <a:cs typeface="Cascadia Code" panose="020B0609020000020004" pitchFamily="49" charset="0"/>
+              </a:rPr>
+              <a:t>{main}</a:t>
+            </a:r>
+            <a:r>
+              <a:rPr lang="en-US" sz="1800" dirty="0" err="1">
+                <a:latin typeface="Cascadia Code" panose="020B0609020000020004" pitchFamily="49" charset="0"/>
+                <a:cs typeface="Cascadia Code" panose="020B0609020000020004" pitchFamily="49" charset="0"/>
+              </a:rPr>
+              <a:t>PSCore</a:t>
+            </a:r>
+            <a:r>
+              <a:rPr lang="en-US" sz="1800" dirty="0">
+                <a:latin typeface="Cascadia Code" panose="020B0609020000020004" pitchFamily="49" charset="0"/>
+                <a:cs typeface="Cascadia Code" panose="020B0609020000020004" pitchFamily="49" charset="0"/>
+              </a:rPr>
+              <a:t> (1:124) &gt;  time {[</a:t>
+            </a:r>
+            <a:r>
+              <a:rPr lang="en-US" sz="1800" dirty="0" err="1">
+                <a:latin typeface="Cascadia Code" panose="020B0609020000020004" pitchFamily="49" charset="0"/>
+                <a:cs typeface="Cascadia Code" panose="020B0609020000020004" pitchFamily="49" charset="0"/>
+              </a:rPr>
+              <a:t>fibclass</a:t>
+            </a:r>
+            <a:r>
+              <a:rPr lang="en-US" sz="1800" dirty="0">
+                <a:latin typeface="Cascadia Code" panose="020B0609020000020004" pitchFamily="49" charset="0"/>
+                <a:cs typeface="Cascadia Code" panose="020B0609020000020004" pitchFamily="49" charset="0"/>
+              </a:rPr>
+              <a:t>]::fib(20)} | foreach </a:t>
+            </a:r>
+            <a:r>
+              <a:rPr lang="en-US" sz="1800" dirty="0" err="1">
+                <a:latin typeface="Cascadia Code" panose="020B0609020000020004" pitchFamily="49" charset="0"/>
+                <a:cs typeface="Cascadia Code" panose="020B0609020000020004" pitchFamily="49" charset="0"/>
+              </a:rPr>
+              <a:t>totalmilliseconds</a:t>
+            </a:r>
+            <a:endParaRPr lang="en-US" sz="1800" dirty="0">
+              <a:latin typeface="Cascadia Code" panose="020B0609020000020004" pitchFamily="49" charset="0"/>
+              <a:cs typeface="Cascadia Code" panose="020B0609020000020004" pitchFamily="49" charset="0"/>
+            </a:endParaRPr>
+          </a:p>
+          <a:p>
+            <a:pPr marL="0" indent="0">
+              <a:lnSpc>
+                <a:spcPct val="120000"/>
+              </a:lnSpc>
+              <a:spcBef>
+                <a:spcPts val="0"/>
+              </a:spcBef>
+              <a:buNone/>
+            </a:pPr>
+            <a:r>
+              <a:rPr lang="en-US" sz="1800" dirty="0">
+                <a:solidFill>
+                  <a:srgbClr val="FF0000"/>
+                </a:solidFill>
+                <a:latin typeface="Cascadia Code" panose="020B0609020000020004" pitchFamily="49" charset="0"/>
+                <a:cs typeface="Cascadia Code" panose="020B0609020000020004" pitchFamily="49" charset="0"/>
+              </a:rPr>
+              <a:t>455.7558</a:t>
+            </a:r>
+          </a:p>
+          <a:p>
+            <a:pPr marL="0" indent="0">
+              <a:lnSpc>
+                <a:spcPct val="120000"/>
+              </a:lnSpc>
+              <a:spcBef>
+                <a:spcPts val="0"/>
+              </a:spcBef>
+              <a:buNone/>
+            </a:pPr>
+            <a:endParaRPr lang="en-US" sz="1800" dirty="0">
+              <a:solidFill>
+                <a:srgbClr val="FF0000"/>
+              </a:solidFill>
+              <a:latin typeface="Cascadia Code" panose="020B0609020000020004" pitchFamily="49" charset="0"/>
+              <a:cs typeface="Cascadia Code" panose="020B0609020000020004" pitchFamily="49" charset="0"/>
+            </a:endParaRPr>
           </a:p>
         </p:txBody>
       </p:sp>
     </p:spTree>
     <p:extLst>
       <p:ext uri="{BB962C8B-B14F-4D97-AF65-F5344CB8AC3E}">
-        <p14:creationId xmlns:p14="http://schemas.microsoft.com/office/powerpoint/2010/main" val="2323771218"/>
+        <p14:creationId xmlns:p14="http://schemas.microsoft.com/office/powerpoint/2010/main" val="1484412332"/>
       </p:ext>
     </p:extLst>
   </p:cSld>
@@ -11158,11 +11174,11 @@
           <a:p>
             <a:r>
               <a:rPr lang="fr-FR" dirty="0" err="1"/>
-              <a:t>Summary</a:t>
-            </a:r>
-            <a:r>
-              <a:rPr lang="fr-FR" dirty="0"/>
-              <a:t>: </a:t>
+              <a:t>Challange</a:t>
+            </a:r>
+            <a:r>
+              <a:rPr lang="fr-FR" dirty="0"/>
+              <a:t> 5: </a:t>
             </a:r>
             <a:endParaRPr lang="en-GB" dirty="0"/>
           </a:p>
@@ -11189,9 +11205,113 @@
           <a:bodyPr/>
           <a:lstStyle/>
           <a:p>
-            <a:r>
-              <a:rPr lang="fr-FR" dirty="0"/>
-              <a:t>It </a:t>
+            <a:pPr>
+              <a:buFont typeface="Wingdings" panose="05000000000000000000" pitchFamily="2" charset="2"/>
+              <a:buChar char="§"/>
+            </a:pPr>
+            <a:r>
+              <a:rPr lang="fr-FR" dirty="0" err="1"/>
+              <a:t>Testing</a:t>
+            </a:r>
+            <a:endParaRPr lang="fr-FR" dirty="0"/>
+          </a:p>
+          <a:p>
+            <a:pPr lvl="1"/>
+            <a:r>
+              <a:rPr lang="fr-FR" dirty="0" err="1"/>
+              <a:t>Could</a:t>
+            </a:r>
+            <a:r>
+              <a:rPr lang="fr-FR" dirty="0"/>
+              <a:t> have </a:t>
+            </a:r>
+            <a:r>
+              <a:rPr lang="fr-FR" dirty="0" err="1"/>
+              <a:t>used</a:t>
+            </a:r>
+            <a:r>
+              <a:rPr lang="fr-FR" dirty="0"/>
+              <a:t> </a:t>
+            </a:r>
+            <a:r>
+              <a:rPr lang="fr-FR" i="1" dirty="0"/>
+              <a:t>Pester</a:t>
+            </a:r>
+            <a:r>
+              <a:rPr lang="fr-FR" dirty="0"/>
+              <a:t> but </a:t>
+            </a:r>
+            <a:r>
+              <a:rPr lang="fr-FR" dirty="0" err="1"/>
+              <a:t>it</a:t>
+            </a:r>
+            <a:r>
+              <a:rPr lang="fr-FR" dirty="0"/>
+              <a:t> </a:t>
+            </a:r>
+            <a:r>
+              <a:rPr lang="fr-FR" dirty="0" err="1"/>
+              <a:t>was</a:t>
+            </a:r>
+            <a:r>
+              <a:rPr lang="fr-FR" dirty="0"/>
+              <a:t> </a:t>
+            </a:r>
+            <a:r>
+              <a:rPr lang="fr-FR" dirty="0" err="1"/>
+              <a:t>simpler</a:t>
+            </a:r>
+            <a:r>
+              <a:rPr lang="fr-FR" dirty="0"/>
+              <a:t> to use a </a:t>
+            </a:r>
+            <a:r>
+              <a:rPr lang="fr-FR" dirty="0" err="1"/>
+              <a:t>Tiny</a:t>
+            </a:r>
+            <a:r>
+              <a:rPr lang="fr-FR" dirty="0"/>
+              <a:t> DSL and </a:t>
+            </a:r>
+            <a:r>
+              <a:rPr lang="fr-FR" dirty="0" err="1"/>
+              <a:t>embedded</a:t>
+            </a:r>
+            <a:r>
+              <a:rPr lang="fr-FR" dirty="0"/>
+              <a:t> tests in the source file.</a:t>
+            </a:r>
+          </a:p>
+          <a:p>
+            <a:pPr lvl="2"/>
+            <a:r>
+              <a:rPr lang="fr-FR" i="1" dirty="0" err="1"/>
+              <a:t>tinytest.tiny</a:t>
+            </a:r>
+            <a:r>
+              <a:rPr lang="fr-FR" i="1" dirty="0"/>
+              <a:t> </a:t>
+            </a:r>
+            <a:r>
+              <a:rPr lang="fr-FR" dirty="0" err="1"/>
+              <a:t>extracts</a:t>
+            </a:r>
+            <a:r>
+              <a:rPr lang="fr-FR" dirty="0"/>
+              <a:t> and runs the tests</a:t>
+            </a:r>
+          </a:p>
+          <a:p>
+            <a:r>
+              <a:rPr lang="fr-FR" dirty="0"/>
+              <a:t>Documentation</a:t>
+            </a:r>
+          </a:p>
+          <a:p>
+            <a:pPr lvl="1"/>
+            <a:r>
+              <a:rPr lang="fr-FR" dirty="0"/>
+              <a:t>Documentation </a:t>
             </a:r>
             <a:r>
               <a:rPr lang="fr-FR" dirty="0" err="1"/>
@@ -11203,184 +11323,58 @@
             </a:r>
             <a:r>
               <a:rPr lang="fr-FR" dirty="0" err="1"/>
-              <a:t>reasonable</a:t>
-            </a:r>
-            <a:r>
-              <a:rPr lang="fr-FR" dirty="0"/>
-              <a:t> to </a:t>
+              <a:t>embedded</a:t>
+            </a:r>
+            <a:r>
+              <a:rPr lang="fr-FR" dirty="0"/>
+              <a:t> in the tiny.ps1 source file</a:t>
+            </a:r>
+          </a:p>
+          <a:p>
+            <a:pPr lvl="2"/>
+            <a:r>
+              <a:rPr lang="fr-FR" i="1" dirty="0" err="1"/>
+              <a:t>tinydoc.tiny</a:t>
+            </a:r>
+            <a:r>
+              <a:rPr lang="fr-FR" i="1" dirty="0"/>
+              <a:t> </a:t>
             </a:r>
             <a:r>
               <a:rPr lang="fr-FR" dirty="0" err="1"/>
-              <a:t>write</a:t>
-            </a:r>
-            <a:r>
-              <a:rPr lang="fr-FR" dirty="0"/>
-              <a:t> a large application in PowerShell</a:t>
-            </a:r>
-          </a:p>
-          <a:p>
-            <a:r>
-              <a:rPr lang="fr-FR" dirty="0"/>
-              <a:t>Most of the </a:t>
+              <a:t>extracts</a:t>
+            </a:r>
+            <a:r>
+              <a:rPr lang="fr-FR" dirty="0"/>
+              <a:t> and </a:t>
             </a:r>
             <a:r>
               <a:rPr lang="fr-FR" dirty="0" err="1"/>
-              <a:t>challanges</a:t>
-            </a:r>
-            <a:r>
-              <a:rPr lang="fr-FR" dirty="0"/>
-              <a:t> </a:t>
+              <a:t>builds</a:t>
+            </a:r>
+            <a:r>
+              <a:rPr lang="fr-FR" dirty="0"/>
+              <a:t> the « </a:t>
             </a:r>
             <a:r>
               <a:rPr lang="fr-FR" dirty="0" err="1"/>
-              <a:t>involved</a:t>
-            </a:r>
-            <a:r>
-              <a:rPr lang="fr-FR" dirty="0"/>
-              <a:t> can </a:t>
-            </a:r>
-            <a:r>
-              <a:rPr lang="fr-FR" dirty="0" err="1"/>
-              <a:t>be</a:t>
-            </a:r>
-            <a:r>
-              <a:rPr lang="fr-FR" dirty="0"/>
-              <a:t> </a:t>
-            </a:r>
-            <a:r>
-              <a:rPr lang="fr-FR" dirty="0" err="1"/>
-              <a:t>mitigated</a:t>
-            </a:r>
-            <a:r>
-              <a:rPr lang="fr-FR" dirty="0"/>
-              <a:t> to a </a:t>
-            </a:r>
-            <a:r>
-              <a:rPr lang="fr-FR" dirty="0" err="1"/>
-              <a:t>significant</a:t>
-            </a:r>
-            <a:r>
-              <a:rPr lang="fr-FR" dirty="0"/>
-              <a:t> </a:t>
-            </a:r>
-            <a:r>
-              <a:rPr lang="fr-FR" dirty="0" err="1"/>
-              <a:t>degree</a:t>
-            </a:r>
+              <a:t>Tiny</a:t>
+            </a:r>
+            <a:r>
+              <a:rPr lang="fr-FR" dirty="0"/>
+              <a:t> Documentation.html » file.</a:t>
+            </a:r>
+          </a:p>
+          <a:p>
+            <a:pPr lvl="2"/>
             <a:endParaRPr lang="fr-FR" dirty="0"/>
-          </a:p>
-          <a:p>
-            <a:r>
-              <a:rPr lang="fr-FR" dirty="0"/>
-              <a:t>Packaging </a:t>
-            </a:r>
-            <a:r>
-              <a:rPr lang="fr-FR" dirty="0" err="1"/>
-              <a:t>however</a:t>
-            </a:r>
-            <a:r>
-              <a:rPr lang="fr-FR" dirty="0"/>
-              <a:t> </a:t>
-            </a:r>
-            <a:r>
-              <a:rPr lang="fr-FR" dirty="0" err="1"/>
-              <a:t>is</a:t>
-            </a:r>
-            <a:r>
-              <a:rPr lang="fr-FR" dirty="0"/>
-              <a:t> a </a:t>
-            </a:r>
-            <a:r>
-              <a:rPr lang="fr-FR" dirty="0" err="1"/>
-              <a:t>problem</a:t>
-            </a:r>
-            <a:endParaRPr lang="fr-FR" dirty="0"/>
-          </a:p>
-          <a:p>
-            <a:pPr lvl="1"/>
-            <a:r>
-              <a:rPr lang="fr-FR" dirty="0"/>
-              <a:t>At one point, </a:t>
-            </a:r>
-            <a:r>
-              <a:rPr lang="fr-FR" dirty="0" err="1"/>
-              <a:t>we</a:t>
-            </a:r>
-            <a:r>
-              <a:rPr lang="fr-FR" dirty="0"/>
-              <a:t> </a:t>
-            </a:r>
-            <a:r>
-              <a:rPr lang="fr-FR" dirty="0" err="1"/>
-              <a:t>were</a:t>
-            </a:r>
-            <a:r>
-              <a:rPr lang="fr-FR" dirty="0"/>
-              <a:t> </a:t>
-            </a:r>
-            <a:r>
-              <a:rPr lang="fr-FR" dirty="0" err="1"/>
-              <a:t>investigating</a:t>
-            </a:r>
-            <a:r>
-              <a:rPr lang="fr-FR" dirty="0"/>
-              <a:t> ‘PowerShell in </a:t>
-            </a:r>
-            <a:r>
-              <a:rPr lang="fr-FR" dirty="0" err="1"/>
-              <a:t>Appliction</a:t>
-            </a:r>
-            <a:r>
-              <a:rPr lang="fr-FR" dirty="0"/>
-              <a:t> Mode’ (PAM) </a:t>
-            </a:r>
-            <a:r>
-              <a:rPr lang="fr-FR" dirty="0" err="1"/>
-              <a:t>however</a:t>
-            </a:r>
-            <a:r>
-              <a:rPr lang="fr-FR" dirty="0"/>
-              <a:t> </a:t>
-            </a:r>
-            <a:r>
-              <a:rPr lang="fr-FR" dirty="0" err="1"/>
-              <a:t>that</a:t>
-            </a:r>
-            <a:r>
-              <a:rPr lang="fr-FR" dirty="0"/>
-              <a:t> </a:t>
-            </a:r>
-            <a:r>
-              <a:rPr lang="fr-FR" dirty="0" err="1"/>
-              <a:t>never</a:t>
-            </a:r>
-            <a:r>
-              <a:rPr lang="fr-FR" dirty="0"/>
-              <a:t> </a:t>
-            </a:r>
-            <a:r>
-              <a:rPr lang="fr-FR" dirty="0" err="1"/>
-              <a:t>went</a:t>
-            </a:r>
-            <a:r>
-              <a:rPr lang="fr-FR" dirty="0"/>
-              <a:t> </a:t>
-            </a:r>
-            <a:r>
-              <a:rPr lang="fr-FR" dirty="0" err="1"/>
-              <a:t>anywhere</a:t>
-            </a:r>
-            <a:r>
-              <a:rPr lang="fr-FR" dirty="0"/>
-              <a:t>.</a:t>
-            </a:r>
           </a:p>
         </p:txBody>
       </p:sp>
     </p:spTree>
     <p:extLst>
       <p:ext uri="{BB962C8B-B14F-4D97-AF65-F5344CB8AC3E}">
-        <p14:creationId xmlns:p14="http://schemas.microsoft.com/office/powerpoint/2010/main" val="269405819"/>
+        <p14:creationId xmlns:p14="http://schemas.microsoft.com/office/powerpoint/2010/main" val="2323771218"/>
       </p:ext>
     </p:extLst>
   </p:cSld>
@@ -11429,24 +11423,12 @@
           <a:lstStyle/>
           <a:p>
             <a:r>
-              <a:rPr lang="fr-FR" dirty="0"/>
-              <a:t>The code </a:t>
-            </a:r>
-            <a:r>
               <a:rPr lang="fr-FR" dirty="0" err="1"/>
-              <a:t>is</a:t>
-            </a:r>
-            <a:r>
-              <a:rPr lang="fr-FR" dirty="0"/>
-              <a:t> </a:t>
-            </a:r>
-            <a:r>
-              <a:rPr lang="fr-FR" dirty="0" err="1"/>
-              <a:t>available</a:t>
-            </a:r>
-            <a:r>
-              <a:rPr lang="fr-FR" dirty="0"/>
-              <a:t> at: </a:t>
+              <a:t>Summary</a:t>
+            </a:r>
+            <a:r>
+              <a:rPr lang="fr-FR" dirty="0"/>
+              <a:t>: </a:t>
             </a:r>
             <a:endParaRPr lang="en-GB" dirty="0"/>
           </a:p>
@@ -11473,6 +11455,290 @@
           <a:bodyPr/>
           <a:lstStyle/>
           <a:p>
+            <a:r>
+              <a:rPr lang="fr-FR" dirty="0"/>
+              <a:t>It </a:t>
+            </a:r>
+            <a:r>
+              <a:rPr lang="fr-FR" dirty="0" err="1"/>
+              <a:t>is</a:t>
+            </a:r>
+            <a:r>
+              <a:rPr lang="fr-FR" dirty="0"/>
+              <a:t> </a:t>
+            </a:r>
+            <a:r>
+              <a:rPr lang="fr-FR" dirty="0" err="1"/>
+              <a:t>reasonable</a:t>
+            </a:r>
+            <a:r>
+              <a:rPr lang="fr-FR" dirty="0"/>
+              <a:t> to </a:t>
+            </a:r>
+            <a:r>
+              <a:rPr lang="fr-FR" dirty="0" err="1"/>
+              <a:t>write</a:t>
+            </a:r>
+            <a:r>
+              <a:rPr lang="fr-FR" dirty="0"/>
+              <a:t> a large application in PowerShell</a:t>
+            </a:r>
+          </a:p>
+          <a:p>
+            <a:r>
+              <a:rPr lang="fr-FR" dirty="0"/>
+              <a:t>Most of the </a:t>
+            </a:r>
+            <a:r>
+              <a:rPr lang="fr-FR" dirty="0" err="1"/>
+              <a:t>challanges</a:t>
+            </a:r>
+            <a:r>
+              <a:rPr lang="fr-FR" dirty="0"/>
+              <a:t> </a:t>
+            </a:r>
+            <a:r>
+              <a:rPr lang="fr-FR" dirty="0" err="1"/>
+              <a:t>involved</a:t>
+            </a:r>
+            <a:r>
+              <a:rPr lang="fr-FR" dirty="0"/>
+              <a:t> can </a:t>
+            </a:r>
+            <a:r>
+              <a:rPr lang="fr-FR" dirty="0" err="1"/>
+              <a:t>be</a:t>
+            </a:r>
+            <a:r>
+              <a:rPr lang="fr-FR" dirty="0"/>
+              <a:t> </a:t>
+            </a:r>
+            <a:r>
+              <a:rPr lang="fr-FR" dirty="0" err="1"/>
+              <a:t>mitigated</a:t>
+            </a:r>
+            <a:r>
+              <a:rPr lang="fr-FR" dirty="0"/>
+              <a:t> to a </a:t>
+            </a:r>
+            <a:r>
+              <a:rPr lang="fr-FR" dirty="0" err="1"/>
+              <a:t>significant</a:t>
+            </a:r>
+            <a:r>
+              <a:rPr lang="fr-FR" dirty="0"/>
+              <a:t> </a:t>
+            </a:r>
+            <a:r>
+              <a:rPr lang="fr-FR" dirty="0" err="1"/>
+              <a:t>degree</a:t>
+            </a:r>
+            <a:endParaRPr lang="fr-FR" dirty="0"/>
+          </a:p>
+          <a:p>
+            <a:r>
+              <a:rPr lang="fr-FR" dirty="0"/>
+              <a:t>Packaging </a:t>
+            </a:r>
+            <a:r>
+              <a:rPr lang="fr-FR" dirty="0" err="1"/>
+              <a:t>however</a:t>
+            </a:r>
+            <a:r>
+              <a:rPr lang="fr-FR" dirty="0"/>
+              <a:t> </a:t>
+            </a:r>
+            <a:r>
+              <a:rPr lang="fr-FR" dirty="0" err="1"/>
+              <a:t>is</a:t>
+            </a:r>
+            <a:r>
+              <a:rPr lang="fr-FR" dirty="0"/>
+              <a:t> a </a:t>
+            </a:r>
+            <a:r>
+              <a:rPr lang="fr-FR" dirty="0" err="1"/>
+              <a:t>problem</a:t>
+            </a:r>
+            <a:endParaRPr lang="fr-FR" dirty="0"/>
+          </a:p>
+          <a:p>
+            <a:pPr lvl="1"/>
+            <a:r>
+              <a:rPr lang="fr-FR" dirty="0"/>
+              <a:t>At one point, </a:t>
+            </a:r>
+            <a:r>
+              <a:rPr lang="fr-FR" dirty="0" err="1"/>
+              <a:t>we</a:t>
+            </a:r>
+            <a:r>
+              <a:rPr lang="fr-FR" dirty="0"/>
+              <a:t> </a:t>
+            </a:r>
+            <a:r>
+              <a:rPr lang="fr-FR" dirty="0" err="1"/>
+              <a:t>were</a:t>
+            </a:r>
+            <a:r>
+              <a:rPr lang="fr-FR" dirty="0"/>
+              <a:t> </a:t>
+            </a:r>
+            <a:r>
+              <a:rPr lang="fr-FR" dirty="0" err="1"/>
+              <a:t>investigating</a:t>
+            </a:r>
+            <a:r>
+              <a:rPr lang="fr-FR" dirty="0"/>
+              <a:t> ‘PowerShell in </a:t>
+            </a:r>
+            <a:r>
+              <a:rPr lang="fr-FR" dirty="0" err="1"/>
+              <a:t>Appliction</a:t>
+            </a:r>
+            <a:r>
+              <a:rPr lang="fr-FR" dirty="0"/>
+              <a:t> Mode’ (PAM) </a:t>
+            </a:r>
+            <a:r>
+              <a:rPr lang="fr-FR" dirty="0" err="1"/>
+              <a:t>however</a:t>
+            </a:r>
+            <a:r>
+              <a:rPr lang="fr-FR" dirty="0"/>
+              <a:t> </a:t>
+            </a:r>
+            <a:r>
+              <a:rPr lang="fr-FR" dirty="0" err="1"/>
+              <a:t>that</a:t>
+            </a:r>
+            <a:r>
+              <a:rPr lang="fr-FR" dirty="0"/>
+              <a:t> </a:t>
+            </a:r>
+            <a:r>
+              <a:rPr lang="fr-FR" dirty="0" err="1"/>
+              <a:t>never</a:t>
+            </a:r>
+            <a:r>
+              <a:rPr lang="fr-FR" dirty="0"/>
+              <a:t> </a:t>
+            </a:r>
+            <a:r>
+              <a:rPr lang="fr-FR" dirty="0" err="1"/>
+              <a:t>went</a:t>
+            </a:r>
+            <a:r>
+              <a:rPr lang="fr-FR" dirty="0"/>
+              <a:t> </a:t>
+            </a:r>
+            <a:r>
+              <a:rPr lang="fr-FR" dirty="0" err="1"/>
+              <a:t>anywhere</a:t>
+            </a:r>
+            <a:r>
+              <a:rPr lang="fr-FR" dirty="0"/>
+              <a:t>.</a:t>
+            </a:r>
+          </a:p>
+        </p:txBody>
+      </p:sp>
+    </p:spTree>
+    <p:extLst>
+      <p:ext uri="{BB962C8B-B14F-4D97-AF65-F5344CB8AC3E}">
+        <p14:creationId xmlns:p14="http://schemas.microsoft.com/office/powerpoint/2010/main" val="269405819"/>
+      </p:ext>
+    </p:extLst>
+  </p:cSld>
+  <p:clrMapOvr>
+    <a:masterClrMapping/>
+  </p:clrMapOvr>
+</p:sld>
+</file>
+
+<file path=ppt/slides/slide18.xml><?xml version="1.0" encoding="utf-8"?>
+<p:sld xmlns:a="http://schemas.openxmlformats.org/drawingml/2006/main" xmlns:r="http://schemas.openxmlformats.org/officeDocument/2006/relationships" xmlns:p="http://schemas.openxmlformats.org/presentationml/2006/main">
+  <p:cSld>
+    <p:spTree>
+      <p:nvGrpSpPr>
+        <p:cNvPr id="1" name=""/>
+        <p:cNvGrpSpPr/>
+        <p:nvPr/>
+      </p:nvGrpSpPr>
+      <p:grpSpPr>
+        <a:xfrm>
+          <a:off x="0" y="0"/>
+          <a:ext cx="0" cy="0"/>
+          <a:chOff x="0" y="0"/>
+          <a:chExt cx="0" cy="0"/>
+        </a:xfrm>
+      </p:grpSpPr>
+      <p:sp>
+        <p:nvSpPr>
+          <p:cNvPr id="2" name="Titre 1">
+            <a:extLst>
+              <a:ext uri="{FF2B5EF4-FFF2-40B4-BE49-F238E27FC236}">
+                <a16:creationId xmlns:a16="http://schemas.microsoft.com/office/drawing/2014/main" id="{5191E0F2-FE77-51ED-3F72-223B58926E74}"/>
+              </a:ext>
+            </a:extLst>
+          </p:cNvPr>
+          <p:cNvSpPr>
+            <a:spLocks noGrp="1"/>
+          </p:cNvSpPr>
+          <p:nvPr>
+            <p:ph type="title"/>
+          </p:nvPr>
+        </p:nvSpPr>
+        <p:spPr/>
+        <p:txBody>
+          <a:bodyPr/>
+          <a:lstStyle/>
+          <a:p>
+            <a:r>
+              <a:rPr lang="fr-FR" dirty="0"/>
+              <a:t>The code </a:t>
+            </a:r>
+            <a:r>
+              <a:rPr lang="fr-FR" dirty="0" err="1"/>
+              <a:t>is</a:t>
+            </a:r>
+            <a:r>
+              <a:rPr lang="fr-FR" dirty="0"/>
+              <a:t> </a:t>
+            </a:r>
+            <a:r>
+              <a:rPr lang="fr-FR" dirty="0" err="1"/>
+              <a:t>available</a:t>
+            </a:r>
+            <a:r>
+              <a:rPr lang="fr-FR" dirty="0"/>
+              <a:t> at: </a:t>
+            </a:r>
+            <a:endParaRPr lang="en-GB" dirty="0"/>
+          </a:p>
+        </p:txBody>
+      </p:sp>
+      <p:sp>
+        <p:nvSpPr>
+          <p:cNvPr id="3" name="Espace réservé du contenu 2">
+            <a:extLst>
+              <a:ext uri="{FF2B5EF4-FFF2-40B4-BE49-F238E27FC236}">
+                <a16:creationId xmlns:a16="http://schemas.microsoft.com/office/drawing/2014/main" id="{07D5023A-BA6F-B725-CF78-FD889E577EA6}"/>
+              </a:ext>
+            </a:extLst>
+          </p:cNvPr>
+          <p:cNvSpPr>
+            <a:spLocks noGrp="1"/>
+          </p:cNvSpPr>
+          <p:nvPr>
+            <p:ph idx="1"/>
+          </p:nvPr>
+        </p:nvSpPr>
+        <p:spPr/>
+        <p:txBody>
+          <a:bodyPr/>
+          <a:lstStyle/>
+          <a:p>
             <a:pPr marL="0" indent="0">
               <a:buNone/>
             </a:pPr>
@@ -11494,7 +11760,7 @@
             </a:r>
             <a:r>
               <a:rPr lang="fr-FR" dirty="0"/>
-              <a:t> </a:t>
+              <a:t> for </a:t>
             </a:r>
             <a:r>
               <a:rPr lang="fr-FR" dirty="0" err="1"/>
@@ -11528,7 +11794,7 @@
 </p:sld>
 </file>
 
-<file path=ppt/slides/slide18.xml><?xml version="1.0" encoding="utf-8"?>
+<file path=ppt/slides/slide19.xml><?xml version="1.0" encoding="utf-8"?>
 <p:sld xmlns:a="http://schemas.openxmlformats.org/drawingml/2006/main" xmlns:r="http://schemas.openxmlformats.org/officeDocument/2006/relationships" xmlns:p="http://schemas.openxmlformats.org/presentationml/2006/main">
   <p:cSld>
     <p:spTree>
@@ -12979,7 +13245,23 @@
             </a:r>
             <a:r>
               <a:rPr lang="fr-FR" dirty="0"/>
-              <a:t> of PowerShell code and documentation</a:t>
+              <a:t> of PowerShell code and documentation (</a:t>
+            </a:r>
+            <a:r>
+              <a:rPr lang="fr-FR" dirty="0" err="1"/>
+              <a:t>too</a:t>
+            </a:r>
+            <a:r>
+              <a:rPr lang="fr-FR" dirty="0"/>
+              <a:t> big for </a:t>
+            </a:r>
+            <a:r>
+              <a:rPr lang="fr-FR" dirty="0" err="1"/>
+              <a:t>VSCode</a:t>
+            </a:r>
+            <a:r>
+              <a:rPr lang="fr-FR" dirty="0"/>
+              <a:t>)</a:t>
             </a:r>
           </a:p>
           <a:p>
@@ -13809,6 +14091,172 @@
 </file>
 
 <file path=ppt/slides/slide7.xml><?xml version="1.0" encoding="utf-8"?>
+<p:sld xmlns:a="http://schemas.openxmlformats.org/drawingml/2006/main" xmlns:r="http://schemas.openxmlformats.org/officeDocument/2006/relationships" xmlns:p="http://schemas.openxmlformats.org/presentationml/2006/main">
+  <p:cSld>
+    <p:spTree>
+      <p:nvGrpSpPr>
+        <p:cNvPr id="1" name=""/>
+        <p:cNvGrpSpPr/>
+        <p:nvPr/>
+      </p:nvGrpSpPr>
+      <p:grpSpPr>
+        <a:xfrm>
+          <a:off x="0" y="0"/>
+          <a:ext cx="0" cy="0"/>
+          <a:chOff x="0" y="0"/>
+          <a:chExt cx="0" cy="0"/>
+        </a:xfrm>
+      </p:grpSpPr>
+      <p:sp>
+        <p:nvSpPr>
+          <p:cNvPr id="2" name="Titre 1">
+            <a:extLst>
+              <a:ext uri="{FF2B5EF4-FFF2-40B4-BE49-F238E27FC236}">
+                <a16:creationId xmlns:a16="http://schemas.microsoft.com/office/drawing/2014/main" id="{5191E0F2-FE77-51ED-3F72-223B58926E74}"/>
+              </a:ext>
+            </a:extLst>
+          </p:cNvPr>
+          <p:cNvSpPr>
+            <a:spLocks noGrp="1"/>
+          </p:cNvSpPr>
+          <p:nvPr>
+            <p:ph type="title"/>
+          </p:nvPr>
+        </p:nvSpPr>
+        <p:spPr/>
+        <p:txBody>
+          <a:bodyPr/>
+          <a:lstStyle/>
+          <a:p>
+            <a:r>
+              <a:rPr lang="fr-FR" dirty="0" err="1"/>
+              <a:t>Tiny</a:t>
+            </a:r>
+            <a:r>
+              <a:rPr lang="fr-FR" dirty="0"/>
+              <a:t> Tools</a:t>
+            </a:r>
+            <a:endParaRPr lang="en-GB" dirty="0"/>
+          </a:p>
+        </p:txBody>
+      </p:sp>
+      <p:sp>
+        <p:nvSpPr>
+          <p:cNvPr id="3" name="Espace réservé du contenu 2">
+            <a:extLst>
+              <a:ext uri="{FF2B5EF4-FFF2-40B4-BE49-F238E27FC236}">
+                <a16:creationId xmlns:a16="http://schemas.microsoft.com/office/drawing/2014/main" id="{07D5023A-BA6F-B725-CF78-FD889E577EA6}"/>
+              </a:ext>
+            </a:extLst>
+          </p:cNvPr>
+          <p:cNvSpPr>
+            <a:spLocks noGrp="1"/>
+          </p:cNvSpPr>
+          <p:nvPr>
+            <p:ph idx="1"/>
+          </p:nvPr>
+        </p:nvSpPr>
+        <p:spPr/>
+        <p:txBody>
+          <a:bodyPr>
+            <a:normAutofit/>
+          </a:bodyPr>
+          <a:lstStyle/>
+          <a:p>
+            <a:pPr>
+              <a:buFont typeface="Wingdings" panose="05000000000000000000" pitchFamily="2" charset="2"/>
+              <a:buChar char="§"/>
+            </a:pPr>
+            <a:r>
+              <a:rPr lang="fr-FR" dirty="0"/>
+              <a:t>Unit tests &amp; tests directory</a:t>
+            </a:r>
+          </a:p>
+          <a:p>
+            <a:pPr lvl="1"/>
+            <a:r>
+              <a:rPr lang="fr-FR" dirty="0"/>
+              <a:t>Embedded unit tests in the </a:t>
+            </a:r>
+            <a:r>
+              <a:rPr lang="fr-FR" dirty="0" err="1"/>
+              <a:t>tiny</a:t>
+            </a:r>
+            <a:r>
+              <a:rPr lang="fr-FR" dirty="0"/>
+              <a:t> source file</a:t>
+            </a:r>
+          </a:p>
+          <a:p>
+            <a:pPr lvl="1"/>
+            <a:r>
+              <a:rPr lang="fr-FR" dirty="0"/>
+              <a:t>Directory </a:t>
+            </a:r>
+            <a:r>
+              <a:rPr lang="fr-FR" dirty="0" err="1"/>
+              <a:t>containing</a:t>
+            </a:r>
+            <a:r>
+              <a:rPr lang="fr-FR" dirty="0"/>
+              <a:t> more </a:t>
+            </a:r>
+            <a:r>
+              <a:rPr lang="fr-FR" dirty="0" err="1"/>
+              <a:t>complex</a:t>
+            </a:r>
+            <a:r>
+              <a:rPr lang="fr-FR" dirty="0"/>
+              <a:t> tests</a:t>
+            </a:r>
+          </a:p>
+          <a:p>
+            <a:r>
+              <a:rPr lang="fr-FR" dirty="0"/>
+              <a:t>Documentation</a:t>
+            </a:r>
+          </a:p>
+          <a:p>
+            <a:pPr lvl="1"/>
+            <a:r>
+              <a:rPr lang="fr-FR" dirty="0" err="1"/>
+              <a:t>Tinydoc</a:t>
+            </a:r>
+            <a:r>
+              <a:rPr lang="fr-FR" dirty="0"/>
+              <a:t> </a:t>
+            </a:r>
+            <a:r>
+              <a:rPr lang="fr-FR" dirty="0" err="1"/>
+              <a:t>tool</a:t>
+            </a:r>
+            <a:r>
+              <a:rPr lang="fr-FR" dirty="0"/>
+              <a:t> and HTML file.</a:t>
+            </a:r>
+          </a:p>
+          <a:p>
+            <a:r>
+              <a:rPr lang="fr-FR" dirty="0"/>
+              <a:t>Modules</a:t>
+            </a:r>
+          </a:p>
+        </p:txBody>
+      </p:sp>
+    </p:spTree>
+    <p:extLst>
+      <p:ext uri="{BB962C8B-B14F-4D97-AF65-F5344CB8AC3E}">
+        <p14:creationId xmlns:p14="http://schemas.microsoft.com/office/powerpoint/2010/main" val="2802887880"/>
+      </p:ext>
+    </p:extLst>
+  </p:cSld>
+  <p:clrMapOvr>
+    <a:masterClrMapping/>
+  </p:clrMapOvr>
+</p:sld>
+</file>
+
+<file path=ppt/slides/slide8.xml><?xml version="1.0" encoding="utf-8"?>
 <p:sld xmlns:a="http://schemas.openxmlformats.org/drawingml/2006/main" xmlns:r="http://schemas.openxmlformats.org/officeDocument/2006/relationships" xmlns:p="http://schemas.openxmlformats.org/presentationml/2006/main">
   <p:cSld>
     <p:spTree>
@@ -13944,270 +14392,6 @@
 </p:sld>
 </file>
 
-<file path=ppt/slides/slide8.xml><?xml version="1.0" encoding="utf-8"?>
-<p:sld xmlns:a="http://schemas.openxmlformats.org/drawingml/2006/main" xmlns:r="http://schemas.openxmlformats.org/officeDocument/2006/relationships" xmlns:p="http://schemas.openxmlformats.org/presentationml/2006/main">
-  <p:cSld>
-    <p:spTree>
-      <p:nvGrpSpPr>
-        <p:cNvPr id="1" name=""/>
-        <p:cNvGrpSpPr/>
-        <p:nvPr/>
-      </p:nvGrpSpPr>
-      <p:grpSpPr>
-        <a:xfrm>
-          <a:off x="0" y="0"/>
-          <a:ext cx="0" cy="0"/>
-          <a:chOff x="0" y="0"/>
-          <a:chExt cx="0" cy="0"/>
-        </a:xfrm>
-      </p:grpSpPr>
-      <p:sp>
-        <p:nvSpPr>
-          <p:cNvPr id="2" name="Titre 1">
-            <a:extLst>
-              <a:ext uri="{FF2B5EF4-FFF2-40B4-BE49-F238E27FC236}">
-                <a16:creationId xmlns:a16="http://schemas.microsoft.com/office/drawing/2014/main" id="{5191E0F2-FE77-51ED-3F72-223B58926E74}"/>
-              </a:ext>
-            </a:extLst>
-          </p:cNvPr>
-          <p:cNvSpPr>
-            <a:spLocks noGrp="1"/>
-          </p:cNvSpPr>
-          <p:nvPr>
-            <p:ph type="title"/>
-          </p:nvPr>
-        </p:nvSpPr>
-        <p:spPr/>
-        <p:txBody>
-          <a:bodyPr/>
-          <a:lstStyle/>
-          <a:p>
-            <a:r>
-              <a:rPr lang="fr-FR" dirty="0" err="1"/>
-              <a:t>Challange</a:t>
-            </a:r>
-            <a:r>
-              <a:rPr lang="fr-FR" dirty="0"/>
-              <a:t> 1</a:t>
-            </a:r>
-            <a:endParaRPr lang="en-GB" dirty="0"/>
-          </a:p>
-        </p:txBody>
-      </p:sp>
-      <p:sp>
-        <p:nvSpPr>
-          <p:cNvPr id="3" name="Espace réservé du contenu 2">
-            <a:extLst>
-              <a:ext uri="{FF2B5EF4-FFF2-40B4-BE49-F238E27FC236}">
-                <a16:creationId xmlns:a16="http://schemas.microsoft.com/office/drawing/2014/main" id="{07D5023A-BA6F-B725-CF78-FD889E577EA6}"/>
-              </a:ext>
-            </a:extLst>
-          </p:cNvPr>
-          <p:cNvSpPr>
-            <a:spLocks noGrp="1"/>
-          </p:cNvSpPr>
-          <p:nvPr>
-            <p:ph idx="1"/>
-          </p:nvPr>
-        </p:nvSpPr>
-        <p:spPr/>
-        <p:txBody>
-          <a:bodyPr>
-            <a:normAutofit lnSpcReduction="10000"/>
-          </a:bodyPr>
-          <a:lstStyle/>
-          <a:p>
-            <a:pPr>
-              <a:buFont typeface="Wingdings" panose="05000000000000000000" pitchFamily="2" charset="2"/>
-              <a:buChar char="§"/>
-            </a:pPr>
-            <a:r>
-              <a:rPr lang="fr-FR" dirty="0"/>
-              <a:t>Source code </a:t>
-            </a:r>
-            <a:r>
-              <a:rPr lang="fr-FR" dirty="0" err="1"/>
-              <a:t>organization</a:t>
-            </a:r>
-            <a:endParaRPr lang="fr-FR" dirty="0"/>
-          </a:p>
-          <a:p>
-            <a:pPr lvl="1"/>
-            <a:r>
-              <a:rPr lang="fr-FR" dirty="0"/>
-              <a:t>A large </a:t>
-            </a:r>
-            <a:r>
-              <a:rPr lang="fr-FR" dirty="0" err="1"/>
-              <a:t>amount</a:t>
-            </a:r>
-            <a:r>
-              <a:rPr lang="fr-FR" dirty="0"/>
-              <a:t> of code </a:t>
-            </a:r>
-            <a:r>
-              <a:rPr lang="fr-FR" dirty="0" err="1"/>
-              <a:t>requires</a:t>
-            </a:r>
-            <a:r>
-              <a:rPr lang="fr-FR" dirty="0"/>
-              <a:t> </a:t>
-            </a:r>
-            <a:r>
-              <a:rPr lang="fr-FR" dirty="0" err="1"/>
-              <a:t>organization</a:t>
-            </a:r>
-            <a:endParaRPr lang="fr-FR" dirty="0"/>
-          </a:p>
-          <a:p>
-            <a:pPr lvl="1"/>
-            <a:r>
-              <a:rPr lang="fr-FR" dirty="0"/>
-              <a:t>PowerShell </a:t>
-            </a:r>
-            <a:r>
-              <a:rPr lang="fr-FR" dirty="0" err="1"/>
-              <a:t>provides</a:t>
-            </a:r>
-            <a:r>
-              <a:rPr lang="fr-FR" dirty="0"/>
-              <a:t> modules but the module </a:t>
-            </a:r>
-            <a:r>
-              <a:rPr lang="fr-FR" dirty="0" err="1"/>
-              <a:t>mechanism</a:t>
-            </a:r>
-            <a:r>
-              <a:rPr lang="fr-FR" dirty="0"/>
-              <a:t> </a:t>
-            </a:r>
-            <a:r>
-              <a:rPr lang="fr-FR" dirty="0" err="1"/>
-              <a:t>is</a:t>
-            </a:r>
-            <a:r>
-              <a:rPr lang="fr-FR" dirty="0"/>
-              <a:t> </a:t>
-            </a:r>
-            <a:r>
-              <a:rPr lang="fr-FR" dirty="0" err="1"/>
-              <a:t>designed</a:t>
-            </a:r>
-            <a:r>
-              <a:rPr lang="fr-FR" dirty="0"/>
-              <a:t> for sharing </a:t>
-            </a:r>
-            <a:r>
-              <a:rPr lang="fr-FR" dirty="0" err="1"/>
-              <a:t>libraries</a:t>
-            </a:r>
-            <a:r>
-              <a:rPr lang="fr-FR" dirty="0"/>
-              <a:t>; not </a:t>
-            </a:r>
-            <a:r>
-              <a:rPr lang="fr-FR" dirty="0" err="1"/>
-              <a:t>really</a:t>
-            </a:r>
-            <a:r>
-              <a:rPr lang="fr-FR" dirty="0"/>
-              <a:t> </a:t>
-            </a:r>
-            <a:r>
-              <a:rPr lang="fr-FR" dirty="0" err="1"/>
-              <a:t>appropriate</a:t>
-            </a:r>
-            <a:r>
-              <a:rPr lang="fr-FR" dirty="0"/>
-              <a:t> for program-</a:t>
-            </a:r>
-            <a:r>
-              <a:rPr lang="fr-FR" dirty="0" err="1"/>
-              <a:t>level</a:t>
-            </a:r>
-            <a:r>
-              <a:rPr lang="fr-FR" dirty="0"/>
-              <a:t> abstractions</a:t>
-            </a:r>
-          </a:p>
-          <a:p>
-            <a:r>
-              <a:rPr lang="fr-FR" dirty="0"/>
-              <a:t>Mitigations</a:t>
-            </a:r>
-          </a:p>
-          <a:p>
-            <a:pPr lvl="1"/>
-            <a:r>
-              <a:rPr lang="fr-FR" dirty="0"/>
-              <a:t>Dot-</a:t>
-            </a:r>
-            <a:r>
-              <a:rPr lang="fr-FR" dirty="0" err="1"/>
-              <a:t>sourcing</a:t>
-            </a:r>
-            <a:r>
-              <a:rPr lang="fr-FR" dirty="0"/>
-              <a:t>?</a:t>
-            </a:r>
-          </a:p>
-          <a:p>
-            <a:pPr lvl="1"/>
-            <a:r>
-              <a:rPr lang="fr-FR" dirty="0" err="1"/>
-              <a:t>Concatenate</a:t>
-            </a:r>
-            <a:r>
-              <a:rPr lang="fr-FR" dirty="0"/>
-              <a:t> component files </a:t>
-            </a:r>
-            <a:r>
-              <a:rPr lang="fr-FR" dirty="0" err="1"/>
-              <a:t>into</a:t>
-            </a:r>
-            <a:r>
-              <a:rPr lang="fr-FR" dirty="0"/>
-              <a:t> 1 large file?</a:t>
-            </a:r>
-          </a:p>
-          <a:p>
-            <a:pPr lvl="1"/>
-            <a:r>
-              <a:rPr lang="fr-FR" dirty="0"/>
-              <a:t>Just deal </a:t>
-            </a:r>
-            <a:r>
-              <a:rPr lang="fr-FR" dirty="0" err="1"/>
-              <a:t>with</a:t>
-            </a:r>
-            <a:r>
-              <a:rPr lang="fr-FR" dirty="0"/>
-              <a:t> a single large file (</a:t>
-            </a:r>
-            <a:r>
-              <a:rPr lang="fr-FR" dirty="0" err="1"/>
-              <a:t>sigh</a:t>
-            </a:r>
-            <a:r>
-              <a:rPr lang="fr-FR" dirty="0"/>
-              <a:t>)</a:t>
-            </a:r>
-          </a:p>
-        </p:txBody>
-      </p:sp>
-    </p:spTree>
-    <p:extLst>
-      <p:ext uri="{BB962C8B-B14F-4D97-AF65-F5344CB8AC3E}">
-        <p14:creationId xmlns:p14="http://schemas.microsoft.com/office/powerpoint/2010/main" val="1038956403"/>
-      </p:ext>
-    </p:extLst>
-  </p:cSld>
-  <p:clrMapOvr>
-    <a:masterClrMapping/>
-  </p:clrMapOvr>
-</p:sld>
-</file>
-
 <file path=ppt/slides/slide9.xml><?xml version="1.0" encoding="utf-8"?>
 <p:sld xmlns:a="http://schemas.openxmlformats.org/drawingml/2006/main" xmlns:r="http://schemas.openxmlformats.org/officeDocument/2006/relationships" xmlns:p="http://schemas.openxmlformats.org/presentationml/2006/main">
   <p:cSld>
@@ -14252,7 +14436,7 @@
             </a:r>
             <a:r>
               <a:rPr lang="fr-FR" dirty="0"/>
-              <a:t> 2</a:t>
+              <a:t> 1</a:t>
             </a:r>
             <a:endParaRPr lang="en-GB" dirty="0"/>
           </a:p>
@@ -14276,7 +14460,9 @@
         </p:nvSpPr>
         <p:spPr/>
         <p:txBody>
-          <a:bodyPr/>
+          <a:bodyPr>
+            <a:normAutofit lnSpcReduction="10000"/>
+          </a:bodyPr>
           <a:lstStyle/>
           <a:p>
             <a:pPr>
@@ -14284,31 +14470,32 @@
               <a:buChar char="§"/>
             </a:pPr>
             <a:r>
+              <a:rPr lang="fr-FR" dirty="0"/>
+              <a:t>Source code </a:t>
+            </a:r>
+            <a:r>
               <a:rPr lang="fr-FR" dirty="0" err="1"/>
-              <a:t>Namespace</a:t>
-            </a:r>
-            <a:r>
-              <a:rPr lang="fr-FR" dirty="0"/>
-              <a:t> management</a:t>
-            </a:r>
+              <a:t>organization</a:t>
+            </a:r>
+            <a:endParaRPr lang="fr-FR" dirty="0"/>
           </a:p>
           <a:p>
             <a:pPr lvl="1"/>
             <a:r>
               <a:rPr lang="fr-FR" dirty="0"/>
-              <a:t>An application </a:t>
+              <a:t>A large </a:t>
             </a:r>
             <a:r>
               <a:rPr lang="fr-FR" dirty="0" err="1"/>
-              <a:t>contains</a:t>
-            </a:r>
-            <a:r>
-              <a:rPr lang="fr-FR" dirty="0"/>
-              <a:t> a lot of  </a:t>
+              <a:t>amount</a:t>
+            </a:r>
+            <a:r>
+              <a:rPr lang="fr-FR" dirty="0"/>
+              <a:t> of code </a:t>
             </a:r>
             <a:r>
               <a:rPr lang="fr-FR" dirty="0" err="1"/>
-              <a:t>named</a:t>
+              <a:t>requires</a:t>
             </a:r>
             <a:r>
               <a:rPr lang="fr-FR" dirty="0"/>
@@ -14316,26 +14503,23 @@
             </a:r>
             <a:r>
               <a:rPr lang="fr-FR" dirty="0" err="1"/>
-              <a:t>entities</a:t>
-            </a:r>
-            <a:r>
-              <a:rPr lang="fr-FR" dirty="0"/>
-              <a:t> (</a:t>
+              <a:t>organization</a:t>
+            </a:r>
+            <a:endParaRPr lang="fr-FR" dirty="0"/>
+          </a:p>
+          <a:p>
+            <a:pPr lvl="1"/>
+            <a:r>
+              <a:rPr lang="fr-FR" dirty="0"/>
+              <a:t>PowerShell </a:t>
             </a:r>
             <a:r>
               <a:rPr lang="fr-FR" dirty="0" err="1"/>
-              <a:t>functions</a:t>
-            </a:r>
-            <a:r>
-              <a:rPr lang="fr-FR" dirty="0"/>
-              <a:t>, data structures)</a:t>
-            </a:r>
-          </a:p>
-          <a:p>
-            <a:pPr lvl="1"/>
-            <a:r>
-              <a:rPr lang="fr-FR" dirty="0"/>
-              <a:t>The module </a:t>
+              <a:t>provides</a:t>
+            </a:r>
+            <a:r>
+              <a:rPr lang="fr-FR" dirty="0"/>
+              <a:t> modules but the module </a:t>
             </a:r>
             <a:r>
               <a:rPr lang="fr-FR" dirty="0" err="1"/>
@@ -14359,7 +14543,15 @@
             </a:r>
             <a:r>
               <a:rPr lang="fr-FR" dirty="0"/>
-              <a:t> for sharing code; not </a:t>
+              <a:t> for sharing </a:t>
+            </a:r>
+            <a:r>
+              <a:rPr lang="fr-FR" dirty="0" err="1"/>
+              <a:t>libraries</a:t>
+            </a:r>
+            <a:r>
+              <a:rPr lang="fr-FR" dirty="0"/>
+              <a:t>; not </a:t>
             </a:r>
             <a:r>
               <a:rPr lang="fr-FR" dirty="0" err="1"/>
@@ -14389,46 +14581,64 @@
           <a:p>
             <a:r>
               <a:rPr lang="fr-FR" dirty="0"/>
-              <a:t>Solution</a:t>
+              <a:t>Mitigations</a:t>
             </a:r>
           </a:p>
           <a:p>
             <a:pPr lvl="1"/>
             <a:r>
               <a:rPr lang="fr-FR" dirty="0"/>
-              <a:t>PowerShell </a:t>
+              <a:t>Dot-</a:t>
             </a:r>
             <a:r>
               <a:rPr lang="fr-FR" dirty="0" err="1"/>
-              <a:t>introduce</a:t>
-            </a:r>
-            <a:r>
-              <a:rPr lang="fr-FR" dirty="0"/>
-              <a:t> user-</a:t>
-            </a:r>
+              <a:t>sourcing</a:t>
+            </a:r>
+            <a:r>
+              <a:rPr lang="fr-FR" dirty="0"/>
+              <a:t>?</a:t>
+            </a:r>
+          </a:p>
+          <a:p>
+            <a:pPr lvl="1"/>
             <a:r>
               <a:rPr lang="fr-FR" dirty="0" err="1"/>
-              <a:t>defined</a:t>
-            </a:r>
-            <a:r>
-              <a:rPr lang="fr-FR" dirty="0"/>
-              <a:t> classes in V5.0. Classes are </a:t>
+              <a:t>Concatenate</a:t>
+            </a:r>
+            <a:r>
+              <a:rPr lang="fr-FR" dirty="0"/>
+              <a:t> component files </a:t>
             </a:r>
             <a:r>
               <a:rPr lang="fr-FR" dirty="0" err="1"/>
-              <a:t>well-suited</a:t>
-            </a:r>
-            <a:r>
-              <a:rPr lang="fr-FR" dirty="0"/>
-              <a:t> for </a:t>
+              <a:t>into</a:t>
+            </a:r>
+            <a:r>
+              <a:rPr lang="fr-FR" dirty="0"/>
+              <a:t> 1 large file?</a:t>
+            </a:r>
+          </a:p>
+          <a:p>
+            <a:pPr lvl="1"/>
+            <a:r>
+              <a:rPr lang="fr-FR" dirty="0"/>
+              <a:t>Just deal </a:t>
             </a:r>
             <a:r>
               <a:rPr lang="fr-FR" dirty="0" err="1"/>
-              <a:t>namespace</a:t>
-            </a:r>
-            <a:r>
-              <a:rPr lang="fr-FR" dirty="0"/>
-              <a:t> management</a:t>
+              <a:t>with</a:t>
+            </a:r>
+            <a:r>
+              <a:rPr lang="fr-FR" dirty="0"/>
+              <a:t> a single large file (</a:t>
+            </a:r>
+            <a:r>
+              <a:rPr lang="fr-FR" dirty="0" err="1"/>
+              <a:t>sigh</a:t>
+            </a:r>
+            <a:r>
+              <a:rPr lang="fr-FR" dirty="0"/>
+              <a:t>)</a:t>
             </a:r>
           </a:p>
         </p:txBody>
@@ -14436,7 +14646,7 @@
     </p:spTree>
     <p:extLst>
       <p:ext uri="{BB962C8B-B14F-4D97-AF65-F5344CB8AC3E}">
-        <p14:creationId xmlns:p14="http://schemas.microsoft.com/office/powerpoint/2010/main" val="1971721765"/>
+        <p14:creationId xmlns:p14="http://schemas.microsoft.com/office/powerpoint/2010/main" val="1038956403"/>
       </p:ext>
     </p:extLst>
   </p:cSld>
@@ -15828,15 +16038,6 @@
 </file>
 
 <file path=customXml/item1.xml><?xml version="1.0" encoding="utf-8"?>
-<?mso-contentType ?>
-<FormTemplates xmlns="http://schemas.microsoft.com/sharepoint/v3/contenttype/forms">
-  <Display>DocumentLibraryForm</Display>
-  <Edit>DocumentLibraryForm</Edit>
-  <New>DocumentLibraryForm</New>
-</FormTemplates>
-</file>
-
-<file path=customXml/item2.xml><?xml version="1.0" encoding="utf-8"?>
 <p:properties xmlns:p="http://schemas.microsoft.com/office/2006/metadata/properties" xmlns:xsi="http://www.w3.org/2001/XMLSchema-instance" xmlns:pc="http://schemas.microsoft.com/office/infopath/2007/PartnerControls">
   <documentManagement>
     <MediaLengthInSeconds xmlns="77a6bfb6-2998-4a23-879f-63f0920c2601" xsi:nil="true"/>
@@ -15846,6 +16047,15 @@
     </lcf76f155ced4ddcb4097134ff3c332f>
   </documentManagement>
 </p:properties>
+</file>
+
+<file path=customXml/item2.xml><?xml version="1.0" encoding="utf-8"?>
+<?mso-contentType ?>
+<FormTemplates xmlns="http://schemas.microsoft.com/sharepoint/v3/contenttype/forms">
+  <Display>DocumentLibraryForm</Display>
+  <Edit>DocumentLibraryForm</Edit>
+  <New>DocumentLibraryForm</New>
+</FormTemplates>
 </file>
 
 <file path=customXml/item3.xml><?xml version="1.0" encoding="utf-8"?>
@@ -16044,20 +16254,20 @@
 </file>
 
 <file path=customXml/itemProps1.xml><?xml version="1.0" encoding="utf-8"?>
-<ds:datastoreItem xmlns:ds="http://schemas.openxmlformats.org/officeDocument/2006/customXml" ds:itemID="{F79F2385-5F5D-40A9-91E4-EC41CD22028D}">
-  <ds:schemaRefs>
-    <ds:schemaRef ds:uri="http://schemas.microsoft.com/sharepoint/v3/contenttype/forms"/>
-  </ds:schemaRefs>
-</ds:datastoreItem>
-</file>
-
-<file path=customXml/itemProps2.xml><?xml version="1.0" encoding="utf-8"?>
 <ds:datastoreItem xmlns:ds="http://schemas.openxmlformats.org/officeDocument/2006/customXml" ds:itemID="{D6E60845-C3D9-4D03-A1AD-12FE491785E0}">
   <ds:schemaRefs>
     <ds:schemaRef ds:uri="http://schemas.microsoft.com/office/2006/metadata/properties"/>
     <ds:schemaRef ds:uri="http://schemas.microsoft.com/office/infopath/2007/PartnerControls"/>
     <ds:schemaRef ds:uri="77a6bfb6-2998-4a23-879f-63f0920c2601"/>
     <ds:schemaRef ds:uri="4563f563-c449-4e77-a40e-5b9e0aaf3585"/>
+  </ds:schemaRefs>
+</ds:datastoreItem>
+</file>
+
+<file path=customXml/itemProps2.xml><?xml version="1.0" encoding="utf-8"?>
+<ds:datastoreItem xmlns:ds="http://schemas.openxmlformats.org/officeDocument/2006/customXml" ds:itemID="{F79F2385-5F5D-40A9-91E4-EC41CD22028D}">
+  <ds:schemaRefs>
+    <ds:schemaRef ds:uri="http://schemas.microsoft.com/sharepoint/v3/contenttype/forms"/>
   </ds:schemaRefs>
 </ds:datastoreItem>
 </file>

</xml_diff>

<commit_message>
Updated tinytest to show the total test duration, bugfix in snake.tiny, tweaked deck.
</commit_message>
<xml_diff>
--- a/PSCONFEU23_payette_tiny.pptx
+++ b/PSCONFEU23_payette_tiny.pptx
@@ -5248,7 +5248,7 @@
           <a:p>
             <a:fld id="{69440670-43D7-400A-ABC5-B69E064DBB37}" type="datetimeFigureOut">
               <a:rPr lang="en-GB" smtClean="0"/>
-              <a:t>14/06/2023</a:t>
+              <a:t>17/06/2023</a:t>
             </a:fld>
             <a:endParaRPr lang="en-GB"/>
           </a:p>
@@ -5425,7 +5425,7 @@
           <a:p>
             <a:fld id="{611B03A4-75C9-4E3D-9183-2102CA9AEC33}" type="datetimeFigureOut">
               <a:rPr lang="en-GB" smtClean="0"/>
-              <a:t>14/06/2023</a:t>
+              <a:t>15/06/2023</a:t>
             </a:fld>
             <a:endParaRPr lang="en-GB"/>
           </a:p>
@@ -12604,6 +12604,19 @@
           <a:p>
             <a:r>
               <a:rPr lang="en-US" dirty="0"/>
+              <a:t>Founding member of the PowerShell team</a:t>
+            </a:r>
+          </a:p>
+          <a:p>
+            <a:pPr lvl="1"/>
+            <a:r>
+              <a:rPr lang="en-US" dirty="0"/>
+              <a:t>Tech lead on the language and engine design</a:t>
+            </a:r>
+          </a:p>
+          <a:p>
+            <a:r>
+              <a:rPr lang="en-US" dirty="0"/>
               <a:t>Formerly:</a:t>
             </a:r>
           </a:p>
@@ -12615,20 +12628,6 @@
             </a:r>
           </a:p>
           <a:p>
-            <a:pPr lvl="2"/>
-            <a:r>
-              <a:rPr lang="en-US" dirty="0"/>
-              <a:t>One of the architects of PowerShell</a:t>
-            </a:r>
-          </a:p>
-          <a:p>
-            <a:pPr lvl="2"/>
-            <a:r>
-              <a:rPr lang="en-US" dirty="0"/>
-              <a:t>Language designer</a:t>
-            </a:r>
-          </a:p>
-          <a:p>
             <a:pPr lvl="1"/>
             <a:r>
               <a:rPr lang="en-US" dirty="0"/>
@@ -12645,7 +12644,7 @@
           <a:p>
             <a:r>
               <a:rPr lang="en-US" dirty="0"/>
-              <a:t>This work is a personal project	</a:t>
+              <a:t>But this work is a personal project	</a:t>
             </a:r>
           </a:p>
         </p:txBody>
@@ -12753,15 +12752,19 @@
             </a:r>
             <a:r>
               <a:rPr lang="fr-FR" dirty="0"/>
-              <a:t> </a:t>
-            </a:r>
-            <a:r>
-              <a:rPr lang="fr-FR" dirty="0" err="1"/>
-              <a:t>managing</a:t>
-            </a:r>
-            <a:r>
-              <a:rPr lang="fr-FR" dirty="0"/>
-              <a:t> a large application </a:t>
+              <a:t> « </a:t>
+            </a:r>
+            <a:r>
+              <a:rPr lang="fr-FR" i="1" dirty="0" err="1"/>
+              <a:t>Managing</a:t>
+            </a:r>
+            <a:r>
+              <a:rPr lang="fr-FR" i="1" dirty="0"/>
+              <a:t> a Large Application </a:t>
+            </a:r>
+            <a:r>
+              <a:rPr lang="fr-FR" dirty="0"/>
+              <a:t>» </a:t>
             </a:r>
             <a:r>
               <a:rPr lang="fr-FR" dirty="0" err="1"/>
@@ -12791,9 +12794,16 @@
             <p:ph idx="1"/>
           </p:nvPr>
         </p:nvSpPr>
-        <p:spPr/>
+        <p:spPr>
+          <a:xfrm>
+            <a:off x="838200" y="1825624"/>
+            <a:ext cx="10515600" cy="4424863"/>
+          </a:xfrm>
+        </p:spPr>
         <p:txBody>
-          <a:bodyPr/>
+          <a:bodyPr>
+            <a:normAutofit fontScale="92500" lnSpcReduction="20000"/>
+          </a:bodyPr>
           <a:lstStyle/>
           <a:p>
             <a:pPr>
@@ -12809,14 +12819,18 @@
             <a:pPr lvl="1"/>
             <a:r>
               <a:rPr lang="fr-FR" dirty="0"/>
-              <a:t>an end-user </a:t>
-            </a:r>
-            <a:r>
-              <a:rPr lang="fr-FR" dirty="0" err="1"/>
+              <a:t>Non-trivial </a:t>
+            </a:r>
+            <a:r>
+              <a:rPr lang="fr-FR" i="1" dirty="0"/>
+              <a:t>end-user </a:t>
+            </a:r>
+            <a:r>
+              <a:rPr lang="fr-FR" i="1" dirty="0" err="1"/>
               <a:t>focused</a:t>
             </a:r>
             <a:r>
-              <a:rPr lang="fr-FR" dirty="0"/>
+              <a:rPr lang="fr-FR" i="1" dirty="0"/>
               <a:t> </a:t>
             </a:r>
             <a:r>
@@ -12850,6 +12864,37 @@
             <a:r>
               <a:rPr lang="fr-FR" dirty="0"/>
               <a:t>)</a:t>
+            </a:r>
+          </a:p>
+          <a:p>
+            <a:pPr lvl="1"/>
+            <a:r>
+              <a:rPr lang="fr-FR" dirty="0"/>
+              <a:t>The user </a:t>
+            </a:r>
+            <a:r>
+              <a:rPr lang="fr-FR" dirty="0" err="1"/>
+              <a:t>does</a:t>
+            </a:r>
+            <a:r>
+              <a:rPr lang="fr-FR" dirty="0"/>
+              <a:t> not know or care about how </a:t>
+            </a:r>
+            <a:r>
+              <a:rPr lang="fr-FR" dirty="0" err="1"/>
+              <a:t>it’s</a:t>
+            </a:r>
+            <a:r>
+              <a:rPr lang="fr-FR" dirty="0"/>
+              <a:t> </a:t>
+            </a:r>
+            <a:r>
+              <a:rPr lang="fr-FR" dirty="0" err="1"/>
+              <a:t>implemented</a:t>
+            </a:r>
+            <a:r>
+              <a:rPr lang="fr-FR" dirty="0"/>
+              <a:t>.</a:t>
             </a:r>
           </a:p>
           <a:p>
@@ -12959,7 +13004,7 @@
             </a:r>
             <a:r>
               <a:rPr lang="fr-FR" dirty="0"/>
-              <a:t> of </a:t>
+              <a:t> of, at least, </a:t>
             </a:r>
             <a:r>
               <a:rPr lang="fr-FR" dirty="0" err="1"/>
@@ -13578,6 +13623,20 @@
                 <a:latin typeface="Cascadia Code" panose="020B0609020000020004" pitchFamily="49" charset="0"/>
                 <a:cs typeface="Cascadia Code" panose="020B0609020000020004" pitchFamily="49" charset="0"/>
               </a:rPr>
+              <a:t>named</a:t>
+            </a:r>
+            <a:r>
+              <a:rPr lang="fr-FR" sz="2000" dirty="0">
+                <a:latin typeface="Cascadia Code" panose="020B0609020000020004" pitchFamily="49" charset="0"/>
+                <a:cs typeface="Cascadia Code" panose="020B0609020000020004" pitchFamily="49" charset="0"/>
+              </a:rPr>
+              <a:t> </a:t>
+            </a:r>
+            <a:r>
+              <a:rPr lang="fr-FR" sz="2000" dirty="0" err="1">
+                <a:latin typeface="Cascadia Code" panose="020B0609020000020004" pitchFamily="49" charset="0"/>
+                <a:cs typeface="Cascadia Code" panose="020B0609020000020004" pitchFamily="49" charset="0"/>
+              </a:rPr>
               <a:t>parameters</a:t>
             </a:r>
             <a:endParaRPr lang="fr-FR" sz="2000" dirty="0">
@@ -13659,35 +13718,35 @@
                 <a:latin typeface="Cascadia Code" panose="020B0609020000020004" pitchFamily="49" charset="0"/>
                 <a:cs typeface="Cascadia Code" panose="020B0609020000020004" pitchFamily="49" charset="0"/>
               </a:rPr>
-              <a:t>" ) *. </a:t>
+              <a:t>" ) *. Name           # </a:t>
             </a:r>
             <a:r>
               <a:rPr lang="fr-FR" sz="2000" dirty="0" err="1">
                 <a:latin typeface="Cascadia Code" panose="020B0609020000020004" pitchFamily="49" charset="0"/>
                 <a:cs typeface="Cascadia Code" panose="020B0609020000020004" pitchFamily="49" charset="0"/>
               </a:rPr>
-              <a:t>Length</a:t>
+              <a:t>access</a:t>
             </a:r>
             <a:r>
               <a:rPr lang="fr-FR" sz="2000" dirty="0">
                 <a:latin typeface="Cascadia Code" panose="020B0609020000020004" pitchFamily="49" charset="0"/>
                 <a:cs typeface="Cascadia Code" panose="020B0609020000020004" pitchFamily="49" charset="0"/>
               </a:rPr>
-              <a:t>         # </a:t>
+              <a:t> </a:t>
             </a:r>
             <a:r>
               <a:rPr lang="fr-FR" sz="2000" dirty="0" err="1">
                 <a:latin typeface="Cascadia Code" panose="020B0609020000020004" pitchFamily="49" charset="0"/>
                 <a:cs typeface="Cascadia Code" panose="020B0609020000020004" pitchFamily="49" charset="0"/>
               </a:rPr>
-              <a:t>dereference</a:t>
+              <a:t>members</a:t>
             </a:r>
             <a:r>
               <a:rPr lang="fr-FR" sz="2000" dirty="0">
                 <a:latin typeface="Cascadia Code" panose="020B0609020000020004" pitchFamily="49" charset="0"/>
                 <a:cs typeface="Cascadia Code" panose="020B0609020000020004" pitchFamily="49" charset="0"/>
               </a:rPr>
-              <a:t> a collection</a:t>
+              <a:t> in a collection</a:t>
             </a:r>
           </a:p>
           <a:p>
@@ -16050,15 +16109,6 @@
 </file>
 
 <file path=customXml/item2.xml><?xml version="1.0" encoding="utf-8"?>
-<?mso-contentType ?>
-<FormTemplates xmlns="http://schemas.microsoft.com/sharepoint/v3/contenttype/forms">
-  <Display>DocumentLibraryForm</Display>
-  <Edit>DocumentLibraryForm</Edit>
-  <New>DocumentLibraryForm</New>
-</FormTemplates>
-</file>
-
-<file path=customXml/item3.xml><?xml version="1.0" encoding="utf-8"?>
 <ct:contentTypeSchema xmlns:ct="http://schemas.microsoft.com/office/2006/metadata/contentType" xmlns:ma="http://schemas.microsoft.com/office/2006/metadata/properties/metaAttributes" ct:_="" ma:_="" ma:contentTypeName="Document" ma:contentTypeID="0x010100BB266CC47A120344A094BC86D4ACDFC1" ma:contentTypeVersion="11" ma:contentTypeDescription="Create a new document." ma:contentTypeScope="" ma:versionID="cec493aae4b0275fd2d698437149b085">
   <xsd:schema xmlns:xsd="http://www.w3.org/2001/XMLSchema" xmlns:xs="http://www.w3.org/2001/XMLSchema" xmlns:p="http://schemas.microsoft.com/office/2006/metadata/properties" xmlns:ns2="77a6bfb6-2998-4a23-879f-63f0920c2601" xmlns:ns3="4563f563-c449-4e77-a40e-5b9e0aaf3585" targetNamespace="http://schemas.microsoft.com/office/2006/metadata/properties" ma:root="true" ma:fieldsID="e85aa437b142273721448b3bdb8073a7" ns2:_="" ns3:_="">
     <xsd:import namespace="77a6bfb6-2998-4a23-879f-63f0920c2601"/>
@@ -16253,6 +16303,15 @@
 </ct:contentTypeSchema>
 </file>
 
+<file path=customXml/item3.xml><?xml version="1.0" encoding="utf-8"?>
+<?mso-contentType ?>
+<FormTemplates xmlns="http://schemas.microsoft.com/sharepoint/v3/contenttype/forms">
+  <Display>DocumentLibraryForm</Display>
+  <Edit>DocumentLibraryForm</Edit>
+  <New>DocumentLibraryForm</New>
+</FormTemplates>
+</file>
+
 <file path=customXml/itemProps1.xml><?xml version="1.0" encoding="utf-8"?>
 <ds:datastoreItem xmlns:ds="http://schemas.openxmlformats.org/officeDocument/2006/customXml" ds:itemID="{D6E60845-C3D9-4D03-A1AD-12FE491785E0}">
   <ds:schemaRefs>
@@ -16265,14 +16324,6 @@
 </file>
 
 <file path=customXml/itemProps2.xml><?xml version="1.0" encoding="utf-8"?>
-<ds:datastoreItem xmlns:ds="http://schemas.openxmlformats.org/officeDocument/2006/customXml" ds:itemID="{F79F2385-5F5D-40A9-91E4-EC41CD22028D}">
-  <ds:schemaRefs>
-    <ds:schemaRef ds:uri="http://schemas.microsoft.com/sharepoint/v3/contenttype/forms"/>
-  </ds:schemaRefs>
-</ds:datastoreItem>
-</file>
-
-<file path=customXml/itemProps3.xml><?xml version="1.0" encoding="utf-8"?>
 <ds:datastoreItem xmlns:ds="http://schemas.openxmlformats.org/officeDocument/2006/customXml" ds:itemID="{968DB50A-8077-450D-89F9-269DB09E6FD0}">
   <ds:schemaRefs>
     <ds:schemaRef ds:uri="http://schemas.microsoft.com/office/2006/metadata/contentType"/>
@@ -16289,4 +16340,12 @@
     <ds:schemaRef ds:uri="http://schemas.microsoft.com/internal/obd"/>
   </ds:schemaRefs>
 </ds:datastoreItem>
+</file>
+
+<file path=customXml/itemProps3.xml><?xml version="1.0" encoding="utf-8"?>
+<ds:datastoreItem xmlns:ds="http://schemas.openxmlformats.org/officeDocument/2006/customXml" ds:itemID="{F79F2385-5F5D-40A9-91E4-EC41CD22028D}">
+  <ds:schemaRefs>
+    <ds:schemaRef ds:uri="http://schemas.microsoft.com/sharepoint/v3/contenttype/forms"/>
+  </ds:schemaRefs>
+</ds:datastoreItem>
 </file>
</xml_diff>